<commit_message>
paper and paper figs
</commit_message>
<xml_diff>
--- a/SV_Figs.pptx
+++ b/SV_Figs.pptx
@@ -105,6 +105,11 @@
       </a:defRPr>
     </a:lvl9pPr>
   </p:defaultTextStyle>
+  <p:extLst>
+    <p:ext uri="{EFAFB233-063F-42B5-8137-9DF3F51BA10A}">
+      <p15:sldGuideLst xmlns:p15="http://schemas.microsoft.com/office/powerpoint/2012/main"/>
+    </p:ext>
+  </p:extLst>
 </p:presentation>
 </file>
 
@@ -255,7 +260,7 @@
           <a:p>
             <a:fld id="{6C463844-4FF9-614F-A5BA-C211E9AFEE28}" type="datetimeFigureOut">
               <a:rPr lang="en-US" smtClean="0"/>
-              <a:t>10/8/22</a:t>
+              <a:t>10/9/22</a:t>
             </a:fld>
             <a:endParaRPr lang="en-US"/>
           </a:p>
@@ -453,7 +458,7 @@
           <a:p>
             <a:fld id="{6C463844-4FF9-614F-A5BA-C211E9AFEE28}" type="datetimeFigureOut">
               <a:rPr lang="en-US" smtClean="0"/>
-              <a:t>10/8/22</a:t>
+              <a:t>10/9/22</a:t>
             </a:fld>
             <a:endParaRPr lang="en-US"/>
           </a:p>
@@ -661,7 +666,7 @@
           <a:p>
             <a:fld id="{6C463844-4FF9-614F-A5BA-C211E9AFEE28}" type="datetimeFigureOut">
               <a:rPr lang="en-US" smtClean="0"/>
-              <a:t>10/8/22</a:t>
+              <a:t>10/9/22</a:t>
             </a:fld>
             <a:endParaRPr lang="en-US"/>
           </a:p>
@@ -859,7 +864,7 @@
           <a:p>
             <a:fld id="{6C463844-4FF9-614F-A5BA-C211E9AFEE28}" type="datetimeFigureOut">
               <a:rPr lang="en-US" smtClean="0"/>
-              <a:t>10/8/22</a:t>
+              <a:t>10/9/22</a:t>
             </a:fld>
             <a:endParaRPr lang="en-US"/>
           </a:p>
@@ -1134,7 +1139,7 @@
           <a:p>
             <a:fld id="{6C463844-4FF9-614F-A5BA-C211E9AFEE28}" type="datetimeFigureOut">
               <a:rPr lang="en-US" smtClean="0"/>
-              <a:t>10/8/22</a:t>
+              <a:t>10/9/22</a:t>
             </a:fld>
             <a:endParaRPr lang="en-US"/>
           </a:p>
@@ -1399,7 +1404,7 @@
           <a:p>
             <a:fld id="{6C463844-4FF9-614F-A5BA-C211E9AFEE28}" type="datetimeFigureOut">
               <a:rPr lang="en-US" smtClean="0"/>
-              <a:t>10/8/22</a:t>
+              <a:t>10/9/22</a:t>
             </a:fld>
             <a:endParaRPr lang="en-US"/>
           </a:p>
@@ -1811,7 +1816,7 @@
           <a:p>
             <a:fld id="{6C463844-4FF9-614F-A5BA-C211E9AFEE28}" type="datetimeFigureOut">
               <a:rPr lang="en-US" smtClean="0"/>
-              <a:t>10/8/22</a:t>
+              <a:t>10/9/22</a:t>
             </a:fld>
             <a:endParaRPr lang="en-US"/>
           </a:p>
@@ -1952,7 +1957,7 @@
           <a:p>
             <a:fld id="{6C463844-4FF9-614F-A5BA-C211E9AFEE28}" type="datetimeFigureOut">
               <a:rPr lang="en-US" smtClean="0"/>
-              <a:t>10/8/22</a:t>
+              <a:t>10/9/22</a:t>
             </a:fld>
             <a:endParaRPr lang="en-US"/>
           </a:p>
@@ -2065,7 +2070,7 @@
           <a:p>
             <a:fld id="{6C463844-4FF9-614F-A5BA-C211E9AFEE28}" type="datetimeFigureOut">
               <a:rPr lang="en-US" smtClean="0"/>
-              <a:t>10/8/22</a:t>
+              <a:t>10/9/22</a:t>
             </a:fld>
             <a:endParaRPr lang="en-US"/>
           </a:p>
@@ -2376,7 +2381,7 @@
           <a:p>
             <a:fld id="{6C463844-4FF9-614F-A5BA-C211E9AFEE28}" type="datetimeFigureOut">
               <a:rPr lang="en-US" smtClean="0"/>
-              <a:t>10/8/22</a:t>
+              <a:t>10/9/22</a:t>
             </a:fld>
             <a:endParaRPr lang="en-US"/>
           </a:p>
@@ -2664,7 +2669,7 @@
           <a:p>
             <a:fld id="{6C463844-4FF9-614F-A5BA-C211E9AFEE28}" type="datetimeFigureOut">
               <a:rPr lang="en-US" smtClean="0"/>
-              <a:t>10/8/22</a:t>
+              <a:t>10/9/22</a:t>
             </a:fld>
             <a:endParaRPr lang="en-US"/>
           </a:p>
@@ -2905,7 +2910,7 @@
           <a:p>
             <a:fld id="{6C463844-4FF9-614F-A5BA-C211E9AFEE28}" type="datetimeFigureOut">
               <a:rPr lang="en-US" smtClean="0"/>
-              <a:t>10/8/22</a:t>
+              <a:t>10/9/22</a:t>
             </a:fld>
             <a:endParaRPr lang="en-US"/>
           </a:p>
@@ -3365,7 +3370,7 @@
         <p:grpSpPr>
           <a:xfrm>
             <a:off x="2662982" y="1609826"/>
-            <a:ext cx="5644489" cy="4336213"/>
+            <a:ext cx="6053506" cy="4883049"/>
             <a:chOff x="350856" y="1529063"/>
             <a:chExt cx="5644489" cy="4336213"/>
           </a:xfrm>

</xml_diff>

<commit_message>
images, slides, and poster
</commit_message>
<xml_diff>
--- a/SV_Figs.pptx
+++ b/SV_Figs.pptx
@@ -6,7 +6,8 @@
   </p:sldMasterIdLst>
   <p:sldIdLst>
     <p:sldId id="256" r:id="rId2"/>
-    <p:sldId id="257" r:id="rId3"/>
+    <p:sldId id="258" r:id="rId3"/>
+    <p:sldId id="257" r:id="rId4"/>
   </p:sldIdLst>
   <p:sldSz cx="12192000" cy="6858000"/>
   <p:notesSz cx="6858000" cy="9144000"/>
@@ -260,7 +261,7 @@
           <a:p>
             <a:fld id="{6C463844-4FF9-614F-A5BA-C211E9AFEE28}" type="datetimeFigureOut">
               <a:rPr lang="en-US" smtClean="0"/>
-              <a:t>10/9/22</a:t>
+              <a:t>2/5/23</a:t>
             </a:fld>
             <a:endParaRPr lang="en-US"/>
           </a:p>
@@ -458,7 +459,7 @@
           <a:p>
             <a:fld id="{6C463844-4FF9-614F-A5BA-C211E9AFEE28}" type="datetimeFigureOut">
               <a:rPr lang="en-US" smtClean="0"/>
-              <a:t>10/9/22</a:t>
+              <a:t>2/5/23</a:t>
             </a:fld>
             <a:endParaRPr lang="en-US"/>
           </a:p>
@@ -666,7 +667,7 @@
           <a:p>
             <a:fld id="{6C463844-4FF9-614F-A5BA-C211E9AFEE28}" type="datetimeFigureOut">
               <a:rPr lang="en-US" smtClean="0"/>
-              <a:t>10/9/22</a:t>
+              <a:t>2/5/23</a:t>
             </a:fld>
             <a:endParaRPr lang="en-US"/>
           </a:p>
@@ -864,7 +865,7 @@
           <a:p>
             <a:fld id="{6C463844-4FF9-614F-A5BA-C211E9AFEE28}" type="datetimeFigureOut">
               <a:rPr lang="en-US" smtClean="0"/>
-              <a:t>10/9/22</a:t>
+              <a:t>2/5/23</a:t>
             </a:fld>
             <a:endParaRPr lang="en-US"/>
           </a:p>
@@ -1139,7 +1140,7 @@
           <a:p>
             <a:fld id="{6C463844-4FF9-614F-A5BA-C211E9AFEE28}" type="datetimeFigureOut">
               <a:rPr lang="en-US" smtClean="0"/>
-              <a:t>10/9/22</a:t>
+              <a:t>2/5/23</a:t>
             </a:fld>
             <a:endParaRPr lang="en-US"/>
           </a:p>
@@ -1404,7 +1405,7 @@
           <a:p>
             <a:fld id="{6C463844-4FF9-614F-A5BA-C211E9AFEE28}" type="datetimeFigureOut">
               <a:rPr lang="en-US" smtClean="0"/>
-              <a:t>10/9/22</a:t>
+              <a:t>2/5/23</a:t>
             </a:fld>
             <a:endParaRPr lang="en-US"/>
           </a:p>
@@ -1816,7 +1817,7 @@
           <a:p>
             <a:fld id="{6C463844-4FF9-614F-A5BA-C211E9AFEE28}" type="datetimeFigureOut">
               <a:rPr lang="en-US" smtClean="0"/>
-              <a:t>10/9/22</a:t>
+              <a:t>2/5/23</a:t>
             </a:fld>
             <a:endParaRPr lang="en-US"/>
           </a:p>
@@ -1957,7 +1958,7 @@
           <a:p>
             <a:fld id="{6C463844-4FF9-614F-A5BA-C211E9AFEE28}" type="datetimeFigureOut">
               <a:rPr lang="en-US" smtClean="0"/>
-              <a:t>10/9/22</a:t>
+              <a:t>2/5/23</a:t>
             </a:fld>
             <a:endParaRPr lang="en-US"/>
           </a:p>
@@ -2070,7 +2071,7 @@
           <a:p>
             <a:fld id="{6C463844-4FF9-614F-A5BA-C211E9AFEE28}" type="datetimeFigureOut">
               <a:rPr lang="en-US" smtClean="0"/>
-              <a:t>10/9/22</a:t>
+              <a:t>2/5/23</a:t>
             </a:fld>
             <a:endParaRPr lang="en-US"/>
           </a:p>
@@ -2381,7 +2382,7 @@
           <a:p>
             <a:fld id="{6C463844-4FF9-614F-A5BA-C211E9AFEE28}" type="datetimeFigureOut">
               <a:rPr lang="en-US" smtClean="0"/>
-              <a:t>10/9/22</a:t>
+              <a:t>2/5/23</a:t>
             </a:fld>
             <a:endParaRPr lang="en-US"/>
           </a:p>
@@ -2669,7 +2670,7 @@
           <a:p>
             <a:fld id="{6C463844-4FF9-614F-A5BA-C211E9AFEE28}" type="datetimeFigureOut">
               <a:rPr lang="en-US" smtClean="0"/>
-              <a:t>10/9/22</a:t>
+              <a:t>2/5/23</a:t>
             </a:fld>
             <a:endParaRPr lang="en-US"/>
           </a:p>
@@ -2910,7 +2911,7 @@
           <a:p>
             <a:fld id="{6C463844-4FF9-614F-A5BA-C211E9AFEE28}" type="datetimeFigureOut">
               <a:rPr lang="en-US" smtClean="0"/>
-              <a:t>10/9/22</a:t>
+              <a:t>2/5/23</a:t>
             </a:fld>
             <a:endParaRPr lang="en-US"/>
           </a:p>
@@ -5943,10 +5944,10 @@
       </p:grpSpPr>
       <p:sp>
         <p:nvSpPr>
-          <p:cNvPr id="2" name="Title 1">
+          <p:cNvPr id="4" name="Title 3">
             <a:extLst>
               <a:ext uri="{FF2B5EF4-FFF2-40B4-BE49-F238E27FC236}">
-                <a16:creationId xmlns:a16="http://schemas.microsoft.com/office/drawing/2014/main" id="{494AB117-FDEC-4EB2-9592-784F17A0F2C9}"/>
+                <a16:creationId xmlns:a16="http://schemas.microsoft.com/office/drawing/2014/main" id="{71D03E36-D763-3CDB-B24A-1E3B29713AFE}"/>
               </a:ext>
             </a:extLst>
           </p:cNvPr>
@@ -5957,15 +5958,3595 @@
             <p:ph type="title"/>
           </p:nvPr>
         </p:nvSpPr>
-        <p:spPr/>
+        <p:spPr>
+          <a:xfrm>
+            <a:off x="449826" y="163525"/>
+            <a:ext cx="10515600" cy="1325563"/>
+          </a:xfrm>
+        </p:spPr>
         <p:txBody>
           <a:bodyPr/>
           <a:lstStyle/>
           <a:p>
-            <a:endParaRPr lang="en-US"/>
+            <a:r>
+              <a:rPr lang="en-US" dirty="0"/>
+              <a:t>Familial Pedigree</a:t>
+            </a:r>
           </a:p>
         </p:txBody>
       </p:sp>
+      <p:grpSp>
+        <p:nvGrpSpPr>
+          <p:cNvPr id="27" name="Group 26">
+            <a:extLst>
+              <a:ext uri="{FF2B5EF4-FFF2-40B4-BE49-F238E27FC236}">
+                <a16:creationId xmlns:a16="http://schemas.microsoft.com/office/drawing/2014/main" id="{B5AF54B6-1507-7B4A-2950-15D1DEFBEF1B}"/>
+              </a:ext>
+            </a:extLst>
+          </p:cNvPr>
+          <p:cNvGrpSpPr/>
+          <p:nvPr/>
+        </p:nvGrpSpPr>
+        <p:grpSpPr>
+          <a:xfrm>
+            <a:off x="3160267" y="2307129"/>
+            <a:ext cx="8376269" cy="3074281"/>
+            <a:chOff x="3160267" y="2307129"/>
+            <a:chExt cx="8376269" cy="3074281"/>
+          </a:xfrm>
+        </p:grpSpPr>
+        <p:grpSp>
+          <p:nvGrpSpPr>
+            <p:cNvPr id="5" name="Group 4">
+              <a:extLst>
+                <a:ext uri="{FF2B5EF4-FFF2-40B4-BE49-F238E27FC236}">
+                  <a16:creationId xmlns:a16="http://schemas.microsoft.com/office/drawing/2014/main" id="{60BDD616-86B4-703F-792B-AE188BCAA62F}"/>
+                </a:ext>
+              </a:extLst>
+            </p:cNvPr>
+            <p:cNvGrpSpPr/>
+            <p:nvPr/>
+          </p:nvGrpSpPr>
+          <p:grpSpPr>
+            <a:xfrm>
+              <a:off x="3160267" y="2307129"/>
+              <a:ext cx="5556221" cy="3074281"/>
+              <a:chOff x="3160267" y="2307129"/>
+              <a:chExt cx="5556221" cy="3074281"/>
+            </a:xfrm>
+          </p:grpSpPr>
+          <p:sp>
+            <p:nvSpPr>
+              <p:cNvPr id="80" name="Rectangle 79">
+                <a:extLst>
+                  <a:ext uri="{FF2B5EF4-FFF2-40B4-BE49-F238E27FC236}">
+                    <a16:creationId xmlns:a16="http://schemas.microsoft.com/office/drawing/2014/main" id="{D47E403A-E405-4B3C-D981-CBD7E7D34DBF}"/>
+                  </a:ext>
+                </a:extLst>
+              </p:cNvPr>
+              <p:cNvSpPr/>
+              <p:nvPr/>
+            </p:nvSpPr>
+            <p:spPr>
+              <a:xfrm>
+                <a:off x="8484116" y="4866553"/>
+                <a:ext cx="225552" cy="463371"/>
+              </a:xfrm>
+              <a:prstGeom prst="rect">
+                <a:avLst/>
+              </a:prstGeom>
+              <a:solidFill>
+                <a:srgbClr val="063E83"/>
+              </a:solidFill>
+              <a:ln w="0">
+                <a:solidFill>
+                  <a:srgbClr val="063E83"/>
+                </a:solidFill>
+              </a:ln>
+            </p:spPr>
+            <p:style>
+              <a:lnRef idx="2">
+                <a:schemeClr val="accent1">
+                  <a:shade val="50000"/>
+                </a:schemeClr>
+              </a:lnRef>
+              <a:fillRef idx="1">
+                <a:schemeClr val="accent1"/>
+              </a:fillRef>
+              <a:effectRef idx="0">
+                <a:schemeClr val="accent1"/>
+              </a:effectRef>
+              <a:fontRef idx="minor">
+                <a:schemeClr val="lt1"/>
+              </a:fontRef>
+            </p:style>
+            <p:txBody>
+              <a:bodyPr rtlCol="0" anchor="ctr"/>
+              <a:lstStyle/>
+              <a:p>
+                <a:pPr algn="ctr"/>
+                <a:endParaRPr lang="en-US"/>
+              </a:p>
+            </p:txBody>
+          </p:sp>
+          <p:grpSp>
+            <p:nvGrpSpPr>
+              <p:cNvPr id="3" name="Group 2">
+                <a:extLst>
+                  <a:ext uri="{FF2B5EF4-FFF2-40B4-BE49-F238E27FC236}">
+                    <a16:creationId xmlns:a16="http://schemas.microsoft.com/office/drawing/2014/main" id="{325CC87F-DE9D-710C-A8CD-1AA0D71DE4C3}"/>
+                  </a:ext>
+                </a:extLst>
+              </p:cNvPr>
+              <p:cNvGrpSpPr/>
+              <p:nvPr/>
+            </p:nvGrpSpPr>
+            <p:grpSpPr>
+              <a:xfrm>
+                <a:off x="3160267" y="2307129"/>
+                <a:ext cx="5556221" cy="3074281"/>
+                <a:chOff x="3160267" y="2307129"/>
+                <a:chExt cx="5556221" cy="3074281"/>
+              </a:xfrm>
+            </p:grpSpPr>
+            <p:sp>
+              <p:nvSpPr>
+                <p:cNvPr id="7" name="Rectangle 6">
+                  <a:extLst>
+                    <a:ext uri="{FF2B5EF4-FFF2-40B4-BE49-F238E27FC236}">
+                      <a16:creationId xmlns:a16="http://schemas.microsoft.com/office/drawing/2014/main" id="{6437962A-11CF-E96C-44C4-69221F8D6B68}"/>
+                    </a:ext>
+                  </a:extLst>
+                </p:cNvPr>
+                <p:cNvSpPr/>
+                <p:nvPr/>
+              </p:nvSpPr>
+              <p:spPr>
+                <a:xfrm>
+                  <a:off x="5313800" y="2348549"/>
+                  <a:ext cx="441297" cy="463371"/>
+                </a:xfrm>
+                <a:prstGeom prst="rect">
+                  <a:avLst/>
+                </a:prstGeom>
+                <a:noFill/>
+                <a:ln w="6350">
+                  <a:solidFill>
+                    <a:schemeClr val="tx1"/>
+                  </a:solidFill>
+                </a:ln>
+              </p:spPr>
+              <p:style>
+                <a:lnRef idx="2">
+                  <a:schemeClr val="accent1">
+                    <a:shade val="50000"/>
+                  </a:schemeClr>
+                </a:lnRef>
+                <a:fillRef idx="1">
+                  <a:schemeClr val="accent1"/>
+                </a:fillRef>
+                <a:effectRef idx="0">
+                  <a:schemeClr val="accent1"/>
+                </a:effectRef>
+                <a:fontRef idx="minor">
+                  <a:schemeClr val="lt1"/>
+                </a:fontRef>
+              </p:style>
+              <p:txBody>
+                <a:bodyPr rtlCol="0" anchor="ctr"/>
+                <a:lstStyle/>
+                <a:p>
+                  <a:pPr algn="ctr"/>
+                  <a:endParaRPr lang="en-US"/>
+                </a:p>
+              </p:txBody>
+            </p:sp>
+            <p:sp>
+              <p:nvSpPr>
+                <p:cNvPr id="8" name="Oval 7">
+                  <a:extLst>
+                    <a:ext uri="{FF2B5EF4-FFF2-40B4-BE49-F238E27FC236}">
+                      <a16:creationId xmlns:a16="http://schemas.microsoft.com/office/drawing/2014/main" id="{06DB1AAF-14C7-EA2E-2D30-1917020CB047}"/>
+                    </a:ext>
+                  </a:extLst>
+                </p:cNvPr>
+                <p:cNvSpPr/>
+                <p:nvPr/>
+              </p:nvSpPr>
+              <p:spPr>
+                <a:xfrm>
+                  <a:off x="6077371" y="2307129"/>
+                  <a:ext cx="490330" cy="514857"/>
+                </a:xfrm>
+                <a:prstGeom prst="ellipse">
+                  <a:avLst/>
+                </a:prstGeom>
+                <a:noFill/>
+                <a:ln w="6350">
+                  <a:solidFill>
+                    <a:schemeClr val="tx1"/>
+                  </a:solidFill>
+                </a:ln>
+              </p:spPr>
+              <p:style>
+                <a:lnRef idx="2">
+                  <a:schemeClr val="accent1">
+                    <a:shade val="50000"/>
+                  </a:schemeClr>
+                </a:lnRef>
+                <a:fillRef idx="1">
+                  <a:schemeClr val="accent1"/>
+                </a:fillRef>
+                <a:effectRef idx="0">
+                  <a:schemeClr val="accent1"/>
+                </a:effectRef>
+                <a:fontRef idx="minor">
+                  <a:schemeClr val="lt1"/>
+                </a:fontRef>
+              </p:style>
+              <p:txBody>
+                <a:bodyPr rtlCol="0" anchor="ctr"/>
+                <a:lstStyle/>
+                <a:p>
+                  <a:pPr algn="ctr"/>
+                  <a:endParaRPr lang="en-US"/>
+                </a:p>
+              </p:txBody>
+            </p:sp>
+            <p:sp>
+              <p:nvSpPr>
+                <p:cNvPr id="9" name="Rectangle 8">
+                  <a:extLst>
+                    <a:ext uri="{FF2B5EF4-FFF2-40B4-BE49-F238E27FC236}">
+                      <a16:creationId xmlns:a16="http://schemas.microsoft.com/office/drawing/2014/main" id="{AA660212-7353-62B0-AE0C-946590266D56}"/>
+                    </a:ext>
+                  </a:extLst>
+                </p:cNvPr>
+                <p:cNvSpPr/>
+                <p:nvPr/>
+              </p:nvSpPr>
+              <p:spPr>
+                <a:xfrm>
+                  <a:off x="4450616" y="3261075"/>
+                  <a:ext cx="441297" cy="463371"/>
+                </a:xfrm>
+                <a:prstGeom prst="rect">
+                  <a:avLst/>
+                </a:prstGeom>
+                <a:solidFill>
+                  <a:srgbClr val="063E83"/>
+                </a:solidFill>
+                <a:ln w="6350">
+                  <a:solidFill>
+                    <a:schemeClr val="tx1"/>
+                  </a:solidFill>
+                </a:ln>
+              </p:spPr>
+              <p:style>
+                <a:lnRef idx="2">
+                  <a:schemeClr val="accent1">
+                    <a:shade val="50000"/>
+                  </a:schemeClr>
+                </a:lnRef>
+                <a:fillRef idx="1">
+                  <a:schemeClr val="accent1"/>
+                </a:fillRef>
+                <a:effectRef idx="0">
+                  <a:schemeClr val="accent1"/>
+                </a:effectRef>
+                <a:fontRef idx="minor">
+                  <a:schemeClr val="lt1"/>
+                </a:fontRef>
+              </p:style>
+              <p:txBody>
+                <a:bodyPr rtlCol="0" anchor="ctr"/>
+                <a:lstStyle/>
+                <a:p>
+                  <a:pPr algn="ctr"/>
+                  <a:endParaRPr lang="en-US"/>
+                </a:p>
+              </p:txBody>
+            </p:sp>
+            <p:sp>
+              <p:nvSpPr>
+                <p:cNvPr id="10" name="Rectangle 9">
+                  <a:extLst>
+                    <a:ext uri="{FF2B5EF4-FFF2-40B4-BE49-F238E27FC236}">
+                      <a16:creationId xmlns:a16="http://schemas.microsoft.com/office/drawing/2014/main" id="{A55040BB-23E4-65A0-6240-3D18F381AB31}"/>
+                    </a:ext>
+                  </a:extLst>
+                </p:cNvPr>
+                <p:cNvSpPr/>
+                <p:nvPr/>
+              </p:nvSpPr>
+              <p:spPr>
+                <a:xfrm>
+                  <a:off x="7510070" y="3261075"/>
+                  <a:ext cx="441297" cy="463371"/>
+                </a:xfrm>
+                <a:prstGeom prst="rect">
+                  <a:avLst/>
+                </a:prstGeom>
+                <a:solidFill>
+                  <a:srgbClr val="063E83"/>
+                </a:solidFill>
+                <a:ln w="6350">
+                  <a:solidFill>
+                    <a:schemeClr val="tx1"/>
+                  </a:solidFill>
+                </a:ln>
+              </p:spPr>
+              <p:style>
+                <a:lnRef idx="2">
+                  <a:schemeClr val="accent1">
+                    <a:shade val="50000"/>
+                  </a:schemeClr>
+                </a:lnRef>
+                <a:fillRef idx="1">
+                  <a:schemeClr val="accent1"/>
+                </a:fillRef>
+                <a:effectRef idx="0">
+                  <a:schemeClr val="accent1"/>
+                </a:effectRef>
+                <a:fontRef idx="minor">
+                  <a:schemeClr val="lt1"/>
+                </a:fontRef>
+              </p:style>
+              <p:txBody>
+                <a:bodyPr rtlCol="0" anchor="ctr"/>
+                <a:lstStyle/>
+                <a:p>
+                  <a:pPr algn="ctr"/>
+                  <a:endParaRPr lang="en-US"/>
+                </a:p>
+              </p:txBody>
+            </p:sp>
+            <p:sp>
+              <p:nvSpPr>
+                <p:cNvPr id="11" name="Rectangle 10">
+                  <a:extLst>
+                    <a:ext uri="{FF2B5EF4-FFF2-40B4-BE49-F238E27FC236}">
+                      <a16:creationId xmlns:a16="http://schemas.microsoft.com/office/drawing/2014/main" id="{364D039F-F087-0209-69C6-4D24FCA07B5A}"/>
+                    </a:ext>
+                  </a:extLst>
+                </p:cNvPr>
+                <p:cNvSpPr/>
+                <p:nvPr/>
+              </p:nvSpPr>
+              <p:spPr>
+                <a:xfrm>
+                  <a:off x="5565095" y="3957203"/>
+                  <a:ext cx="441297" cy="463371"/>
+                </a:xfrm>
+                <a:prstGeom prst="rect">
+                  <a:avLst/>
+                </a:prstGeom>
+                <a:noFill/>
+                <a:ln w="6350">
+                  <a:solidFill>
+                    <a:schemeClr val="tx1"/>
+                  </a:solidFill>
+                </a:ln>
+              </p:spPr>
+              <p:style>
+                <a:lnRef idx="2">
+                  <a:schemeClr val="accent1">
+                    <a:shade val="50000"/>
+                  </a:schemeClr>
+                </a:lnRef>
+                <a:fillRef idx="1">
+                  <a:schemeClr val="accent1"/>
+                </a:fillRef>
+                <a:effectRef idx="0">
+                  <a:schemeClr val="accent1"/>
+                </a:effectRef>
+                <a:fontRef idx="minor">
+                  <a:schemeClr val="lt1"/>
+                </a:fontRef>
+              </p:style>
+              <p:txBody>
+                <a:bodyPr rtlCol="0" anchor="ctr"/>
+                <a:lstStyle/>
+                <a:p>
+                  <a:pPr algn="ctr"/>
+                  <a:endParaRPr lang="en-US"/>
+                </a:p>
+              </p:txBody>
+            </p:sp>
+            <p:sp>
+              <p:nvSpPr>
+                <p:cNvPr id="12" name="Rectangle 11">
+                  <a:extLst>
+                    <a:ext uri="{FF2B5EF4-FFF2-40B4-BE49-F238E27FC236}">
+                      <a16:creationId xmlns:a16="http://schemas.microsoft.com/office/drawing/2014/main" id="{7432417A-959C-D3A2-DBAD-EEA0984E8583}"/>
+                    </a:ext>
+                  </a:extLst>
+                </p:cNvPr>
+                <p:cNvSpPr/>
+                <p:nvPr/>
+              </p:nvSpPr>
+              <p:spPr>
+                <a:xfrm>
+                  <a:off x="6558012" y="4072305"/>
+                  <a:ext cx="441297" cy="463371"/>
+                </a:xfrm>
+                <a:prstGeom prst="rect">
+                  <a:avLst/>
+                </a:prstGeom>
+                <a:solidFill>
+                  <a:srgbClr val="063E83"/>
+                </a:solidFill>
+                <a:ln w="6350">
+                  <a:solidFill>
+                    <a:schemeClr val="tx1"/>
+                  </a:solidFill>
+                </a:ln>
+              </p:spPr>
+              <p:style>
+                <a:lnRef idx="2">
+                  <a:schemeClr val="accent1">
+                    <a:shade val="50000"/>
+                  </a:schemeClr>
+                </a:lnRef>
+                <a:fillRef idx="1">
+                  <a:schemeClr val="accent1"/>
+                </a:fillRef>
+                <a:effectRef idx="0">
+                  <a:schemeClr val="accent1"/>
+                </a:effectRef>
+                <a:fontRef idx="minor">
+                  <a:schemeClr val="lt1"/>
+                </a:fontRef>
+              </p:style>
+              <p:txBody>
+                <a:bodyPr rtlCol="0" anchor="ctr"/>
+                <a:lstStyle/>
+                <a:p>
+                  <a:pPr algn="ctr"/>
+                  <a:endParaRPr lang="en-US"/>
+                </a:p>
+              </p:txBody>
+            </p:sp>
+            <p:sp>
+              <p:nvSpPr>
+                <p:cNvPr id="13" name="Rectangle 12">
+                  <a:extLst>
+                    <a:ext uri="{FF2B5EF4-FFF2-40B4-BE49-F238E27FC236}">
+                      <a16:creationId xmlns:a16="http://schemas.microsoft.com/office/drawing/2014/main" id="{22030D70-E6C3-5AC2-4819-4C1F72CCE430}"/>
+                    </a:ext>
+                  </a:extLst>
+                </p:cNvPr>
+                <p:cNvSpPr/>
+                <p:nvPr/>
+              </p:nvSpPr>
+              <p:spPr>
+                <a:xfrm>
+                  <a:off x="8259868" y="4072305"/>
+                  <a:ext cx="441297" cy="463371"/>
+                </a:xfrm>
+                <a:prstGeom prst="rect">
+                  <a:avLst/>
+                </a:prstGeom>
+                <a:noFill/>
+                <a:ln w="6350">
+                  <a:solidFill>
+                    <a:schemeClr val="tx1"/>
+                  </a:solidFill>
+                </a:ln>
+              </p:spPr>
+              <p:style>
+                <a:lnRef idx="2">
+                  <a:schemeClr val="accent1">
+                    <a:shade val="50000"/>
+                  </a:schemeClr>
+                </a:lnRef>
+                <a:fillRef idx="1">
+                  <a:schemeClr val="accent1"/>
+                </a:fillRef>
+                <a:effectRef idx="0">
+                  <a:schemeClr val="accent1"/>
+                </a:effectRef>
+                <a:fontRef idx="minor">
+                  <a:schemeClr val="lt1"/>
+                </a:fontRef>
+              </p:style>
+              <p:txBody>
+                <a:bodyPr rtlCol="0" anchor="ctr"/>
+                <a:lstStyle/>
+                <a:p>
+                  <a:pPr algn="ctr"/>
+                  <a:endParaRPr lang="en-US"/>
+                </a:p>
+              </p:txBody>
+            </p:sp>
+            <p:sp>
+              <p:nvSpPr>
+                <p:cNvPr id="14" name="Rectangle 13">
+                  <a:extLst>
+                    <a:ext uri="{FF2B5EF4-FFF2-40B4-BE49-F238E27FC236}">
+                      <a16:creationId xmlns:a16="http://schemas.microsoft.com/office/drawing/2014/main" id="{E8A66599-C5C2-E898-B5E0-6E185884484B}"/>
+                    </a:ext>
+                  </a:extLst>
+                </p:cNvPr>
+                <p:cNvSpPr/>
+                <p:nvPr/>
+              </p:nvSpPr>
+              <p:spPr>
+                <a:xfrm>
+                  <a:off x="3160267" y="4081915"/>
+                  <a:ext cx="441297" cy="463371"/>
+                </a:xfrm>
+                <a:prstGeom prst="rect">
+                  <a:avLst/>
+                </a:prstGeom>
+                <a:noFill/>
+                <a:ln w="6350">
+                  <a:solidFill>
+                    <a:schemeClr val="tx1"/>
+                  </a:solidFill>
+                </a:ln>
+              </p:spPr>
+              <p:style>
+                <a:lnRef idx="2">
+                  <a:schemeClr val="accent1">
+                    <a:shade val="50000"/>
+                  </a:schemeClr>
+                </a:lnRef>
+                <a:fillRef idx="1">
+                  <a:schemeClr val="accent1"/>
+                </a:fillRef>
+                <a:effectRef idx="0">
+                  <a:schemeClr val="accent1"/>
+                </a:effectRef>
+                <a:fontRef idx="minor">
+                  <a:schemeClr val="lt1"/>
+                </a:fontRef>
+              </p:style>
+              <p:txBody>
+                <a:bodyPr rtlCol="0" anchor="ctr"/>
+                <a:lstStyle/>
+                <a:p>
+                  <a:pPr algn="ctr"/>
+                  <a:endParaRPr lang="en-US"/>
+                </a:p>
+              </p:txBody>
+            </p:sp>
+            <p:sp>
+              <p:nvSpPr>
+                <p:cNvPr id="15" name="Rectangle 14">
+                  <a:extLst>
+                    <a:ext uri="{FF2B5EF4-FFF2-40B4-BE49-F238E27FC236}">
+                      <a16:creationId xmlns:a16="http://schemas.microsoft.com/office/drawing/2014/main" id="{7E2F7BEF-C053-D1AD-5C19-1672496E8B0D}"/>
+                    </a:ext>
+                  </a:extLst>
+                </p:cNvPr>
+                <p:cNvSpPr/>
+                <p:nvPr/>
+              </p:nvSpPr>
+              <p:spPr>
+                <a:xfrm>
+                  <a:off x="3662858" y="4866553"/>
+                  <a:ext cx="441297" cy="463371"/>
+                </a:xfrm>
+                <a:prstGeom prst="rect">
+                  <a:avLst/>
+                </a:prstGeom>
+                <a:noFill/>
+                <a:ln w="6350">
+                  <a:solidFill>
+                    <a:schemeClr val="tx1"/>
+                  </a:solidFill>
+                </a:ln>
+              </p:spPr>
+              <p:style>
+                <a:lnRef idx="2">
+                  <a:schemeClr val="accent1">
+                    <a:shade val="50000"/>
+                  </a:schemeClr>
+                </a:lnRef>
+                <a:fillRef idx="1">
+                  <a:schemeClr val="accent1"/>
+                </a:fillRef>
+                <a:effectRef idx="0">
+                  <a:schemeClr val="accent1"/>
+                </a:effectRef>
+                <a:fontRef idx="minor">
+                  <a:schemeClr val="lt1"/>
+                </a:fontRef>
+              </p:style>
+              <p:txBody>
+                <a:bodyPr rtlCol="0" anchor="ctr"/>
+                <a:lstStyle/>
+                <a:p>
+                  <a:pPr algn="ctr"/>
+                  <a:endParaRPr lang="en-US"/>
+                </a:p>
+              </p:txBody>
+            </p:sp>
+            <p:sp>
+              <p:nvSpPr>
+                <p:cNvPr id="16" name="Rectangle 15">
+                  <a:extLst>
+                    <a:ext uri="{FF2B5EF4-FFF2-40B4-BE49-F238E27FC236}">
+                      <a16:creationId xmlns:a16="http://schemas.microsoft.com/office/drawing/2014/main" id="{2090D8FD-353D-D1E2-2208-3F4EAA733C92}"/>
+                    </a:ext>
+                  </a:extLst>
+                </p:cNvPr>
+                <p:cNvSpPr/>
+                <p:nvPr/>
+              </p:nvSpPr>
+              <p:spPr>
+                <a:xfrm>
+                  <a:off x="8275191" y="4866553"/>
+                  <a:ext cx="441297" cy="463371"/>
+                </a:xfrm>
+                <a:prstGeom prst="rect">
+                  <a:avLst/>
+                </a:prstGeom>
+                <a:noFill/>
+                <a:ln w="6350">
+                  <a:solidFill>
+                    <a:schemeClr val="tx1"/>
+                  </a:solidFill>
+                </a:ln>
+              </p:spPr>
+              <p:style>
+                <a:lnRef idx="2">
+                  <a:schemeClr val="accent1">
+                    <a:shade val="50000"/>
+                  </a:schemeClr>
+                </a:lnRef>
+                <a:fillRef idx="1">
+                  <a:schemeClr val="accent1"/>
+                </a:fillRef>
+                <a:effectRef idx="0">
+                  <a:schemeClr val="accent1"/>
+                </a:effectRef>
+                <a:fontRef idx="minor">
+                  <a:schemeClr val="lt1"/>
+                </a:fontRef>
+              </p:style>
+              <p:txBody>
+                <a:bodyPr rtlCol="0" anchor="ctr"/>
+                <a:lstStyle/>
+                <a:p>
+                  <a:pPr algn="ctr"/>
+                  <a:endParaRPr lang="en-US"/>
+                </a:p>
+              </p:txBody>
+            </p:sp>
+            <p:sp>
+              <p:nvSpPr>
+                <p:cNvPr id="20" name="Oval 19">
+                  <a:extLst>
+                    <a:ext uri="{FF2B5EF4-FFF2-40B4-BE49-F238E27FC236}">
+                      <a16:creationId xmlns:a16="http://schemas.microsoft.com/office/drawing/2014/main" id="{1EF44FC6-F897-D6BF-53DF-55A665A221CA}"/>
+                    </a:ext>
+                  </a:extLst>
+                </p:cNvPr>
+                <p:cNvSpPr/>
+                <p:nvPr/>
+              </p:nvSpPr>
+              <p:spPr>
+                <a:xfrm>
+                  <a:off x="3643775" y="3248479"/>
+                  <a:ext cx="490330" cy="514857"/>
+                </a:xfrm>
+                <a:prstGeom prst="ellipse">
+                  <a:avLst/>
+                </a:prstGeom>
+                <a:solidFill>
+                  <a:srgbClr val="063E83"/>
+                </a:solidFill>
+                <a:ln w="6350">
+                  <a:solidFill>
+                    <a:schemeClr val="tx1"/>
+                  </a:solidFill>
+                </a:ln>
+              </p:spPr>
+              <p:style>
+                <a:lnRef idx="2">
+                  <a:schemeClr val="accent1">
+                    <a:shade val="50000"/>
+                  </a:schemeClr>
+                </a:lnRef>
+                <a:fillRef idx="1">
+                  <a:schemeClr val="accent1"/>
+                </a:fillRef>
+                <a:effectRef idx="0">
+                  <a:schemeClr val="accent1"/>
+                </a:effectRef>
+                <a:fontRef idx="minor">
+                  <a:schemeClr val="lt1"/>
+                </a:fontRef>
+              </p:style>
+              <p:txBody>
+                <a:bodyPr rtlCol="0" anchor="ctr"/>
+                <a:lstStyle/>
+                <a:p>
+                  <a:pPr algn="ctr"/>
+                  <a:endParaRPr lang="en-US"/>
+                </a:p>
+              </p:txBody>
+            </p:sp>
+            <p:sp>
+              <p:nvSpPr>
+                <p:cNvPr id="21" name="Oval 20">
+                  <a:extLst>
+                    <a:ext uri="{FF2B5EF4-FFF2-40B4-BE49-F238E27FC236}">
+                      <a16:creationId xmlns:a16="http://schemas.microsoft.com/office/drawing/2014/main" id="{5EC982B5-2776-8EFE-D635-1D490A7D3BE7}"/>
+                    </a:ext>
+                  </a:extLst>
+                </p:cNvPr>
+                <p:cNvSpPr/>
+                <p:nvPr/>
+              </p:nvSpPr>
+              <p:spPr>
+                <a:xfrm>
+                  <a:off x="3997224" y="4049735"/>
+                  <a:ext cx="490330" cy="514857"/>
+                </a:xfrm>
+                <a:prstGeom prst="ellipse">
+                  <a:avLst/>
+                </a:prstGeom>
+                <a:solidFill>
+                  <a:srgbClr val="063E83"/>
+                </a:solidFill>
+                <a:ln w="6350">
+                  <a:solidFill>
+                    <a:schemeClr val="tx1"/>
+                  </a:solidFill>
+                </a:ln>
+              </p:spPr>
+              <p:style>
+                <a:lnRef idx="2">
+                  <a:schemeClr val="accent1">
+                    <a:shade val="50000"/>
+                  </a:schemeClr>
+                </a:lnRef>
+                <a:fillRef idx="1">
+                  <a:schemeClr val="accent1"/>
+                </a:fillRef>
+                <a:effectRef idx="0">
+                  <a:schemeClr val="accent1"/>
+                </a:effectRef>
+                <a:fontRef idx="minor">
+                  <a:schemeClr val="lt1"/>
+                </a:fontRef>
+              </p:style>
+              <p:txBody>
+                <a:bodyPr rtlCol="0" anchor="ctr"/>
+                <a:lstStyle/>
+                <a:p>
+                  <a:pPr algn="ctr"/>
+                  <a:endParaRPr lang="en-US"/>
+                </a:p>
+              </p:txBody>
+            </p:sp>
+            <p:sp>
+              <p:nvSpPr>
+                <p:cNvPr id="22" name="Oval 21">
+                  <a:extLst>
+                    <a:ext uri="{FF2B5EF4-FFF2-40B4-BE49-F238E27FC236}">
+                      <a16:creationId xmlns:a16="http://schemas.microsoft.com/office/drawing/2014/main" id="{5BFC2F09-21CC-83A3-189F-0DEC3F809007}"/>
+                    </a:ext>
+                  </a:extLst>
+                </p:cNvPr>
+                <p:cNvSpPr/>
+                <p:nvPr/>
+              </p:nvSpPr>
+              <p:spPr>
+                <a:xfrm>
+                  <a:off x="4865006" y="3957203"/>
+                  <a:ext cx="490330" cy="514857"/>
+                </a:xfrm>
+                <a:prstGeom prst="ellipse">
+                  <a:avLst/>
+                </a:prstGeom>
+                <a:noFill/>
+                <a:ln w="6350">
+                  <a:solidFill>
+                    <a:schemeClr val="tx1"/>
+                  </a:solidFill>
+                </a:ln>
+              </p:spPr>
+              <p:style>
+                <a:lnRef idx="2">
+                  <a:schemeClr val="accent1">
+                    <a:shade val="50000"/>
+                  </a:schemeClr>
+                </a:lnRef>
+                <a:fillRef idx="1">
+                  <a:schemeClr val="accent1"/>
+                </a:fillRef>
+                <a:effectRef idx="0">
+                  <a:schemeClr val="accent1"/>
+                </a:effectRef>
+                <a:fontRef idx="minor">
+                  <a:schemeClr val="lt1"/>
+                </a:fontRef>
+              </p:style>
+              <p:txBody>
+                <a:bodyPr rtlCol="0" anchor="ctr"/>
+                <a:lstStyle/>
+                <a:p>
+                  <a:pPr algn="ctr"/>
+                  <a:endParaRPr lang="en-US"/>
+                </a:p>
+              </p:txBody>
+            </p:sp>
+            <p:sp>
+              <p:nvSpPr>
+                <p:cNvPr id="23" name="Oval 22">
+                  <a:extLst>
+                    <a:ext uri="{FF2B5EF4-FFF2-40B4-BE49-F238E27FC236}">
+                      <a16:creationId xmlns:a16="http://schemas.microsoft.com/office/drawing/2014/main" id="{FCF8F2A5-C33A-FD80-7FF4-4EA573F997F3}"/>
+                    </a:ext>
+                  </a:extLst>
+                </p:cNvPr>
+                <p:cNvSpPr/>
+                <p:nvPr/>
+              </p:nvSpPr>
+              <p:spPr>
+                <a:xfrm>
+                  <a:off x="5150178" y="4752041"/>
+                  <a:ext cx="490330" cy="514857"/>
+                </a:xfrm>
+                <a:prstGeom prst="ellipse">
+                  <a:avLst/>
+                </a:prstGeom>
+                <a:noFill/>
+                <a:ln w="6350">
+                  <a:solidFill>
+                    <a:schemeClr val="tx1"/>
+                  </a:solidFill>
+                </a:ln>
+              </p:spPr>
+              <p:style>
+                <a:lnRef idx="2">
+                  <a:schemeClr val="accent1">
+                    <a:shade val="50000"/>
+                  </a:schemeClr>
+                </a:lnRef>
+                <a:fillRef idx="1">
+                  <a:schemeClr val="accent1"/>
+                </a:fillRef>
+                <a:effectRef idx="0">
+                  <a:schemeClr val="accent1"/>
+                </a:effectRef>
+                <a:fontRef idx="minor">
+                  <a:schemeClr val="lt1"/>
+                </a:fontRef>
+              </p:style>
+              <p:txBody>
+                <a:bodyPr rtlCol="0" anchor="ctr"/>
+                <a:lstStyle/>
+                <a:p>
+                  <a:pPr algn="ctr"/>
+                  <a:endParaRPr lang="en-US"/>
+                </a:p>
+              </p:txBody>
+            </p:sp>
+            <p:sp>
+              <p:nvSpPr>
+                <p:cNvPr id="24" name="Oval 23">
+                  <a:extLst>
+                    <a:ext uri="{FF2B5EF4-FFF2-40B4-BE49-F238E27FC236}">
+                      <a16:creationId xmlns:a16="http://schemas.microsoft.com/office/drawing/2014/main" id="{C63EBD15-2269-042E-8A73-619E74AE4F8C}"/>
+                    </a:ext>
+                  </a:extLst>
+                </p:cNvPr>
+                <p:cNvSpPr/>
+                <p:nvPr/>
+              </p:nvSpPr>
+              <p:spPr>
+                <a:xfrm>
+                  <a:off x="7413454" y="4866553"/>
+                  <a:ext cx="490330" cy="514857"/>
+                </a:xfrm>
+                <a:prstGeom prst="ellipse">
+                  <a:avLst/>
+                </a:prstGeom>
+                <a:noFill/>
+                <a:ln w="6350">
+                  <a:solidFill>
+                    <a:schemeClr val="tx1"/>
+                  </a:solidFill>
+                </a:ln>
+              </p:spPr>
+              <p:style>
+                <a:lnRef idx="2">
+                  <a:schemeClr val="accent1">
+                    <a:shade val="50000"/>
+                  </a:schemeClr>
+                </a:lnRef>
+                <a:fillRef idx="1">
+                  <a:schemeClr val="accent1"/>
+                </a:fillRef>
+                <a:effectRef idx="0">
+                  <a:schemeClr val="accent1"/>
+                </a:effectRef>
+                <a:fontRef idx="minor">
+                  <a:schemeClr val="lt1"/>
+                </a:fontRef>
+              </p:style>
+              <p:txBody>
+                <a:bodyPr rtlCol="0" anchor="ctr"/>
+                <a:lstStyle/>
+                <a:p>
+                  <a:pPr algn="ctr"/>
+                  <a:endParaRPr lang="en-US"/>
+                </a:p>
+              </p:txBody>
+            </p:sp>
+            <p:sp>
+              <p:nvSpPr>
+                <p:cNvPr id="25" name="Oval 24">
+                  <a:extLst>
+                    <a:ext uri="{FF2B5EF4-FFF2-40B4-BE49-F238E27FC236}">
+                      <a16:creationId xmlns:a16="http://schemas.microsoft.com/office/drawing/2014/main" id="{10C52E74-C714-E60F-A0CA-8C48E48BAA0E}"/>
+                    </a:ext>
+                  </a:extLst>
+                </p:cNvPr>
+                <p:cNvSpPr/>
+                <p:nvPr/>
+              </p:nvSpPr>
+              <p:spPr>
+                <a:xfrm>
+                  <a:off x="7571363" y="4040082"/>
+                  <a:ext cx="490330" cy="514857"/>
+                </a:xfrm>
+                <a:prstGeom prst="ellipse">
+                  <a:avLst/>
+                </a:prstGeom>
+                <a:noFill/>
+                <a:ln w="6350">
+                  <a:solidFill>
+                    <a:schemeClr val="tx1"/>
+                  </a:solidFill>
+                </a:ln>
+              </p:spPr>
+              <p:style>
+                <a:lnRef idx="2">
+                  <a:schemeClr val="accent1">
+                    <a:shade val="50000"/>
+                  </a:schemeClr>
+                </a:lnRef>
+                <a:fillRef idx="1">
+                  <a:schemeClr val="accent1"/>
+                </a:fillRef>
+                <a:effectRef idx="0">
+                  <a:schemeClr val="accent1"/>
+                </a:effectRef>
+                <a:fontRef idx="minor">
+                  <a:schemeClr val="lt1"/>
+                </a:fontRef>
+              </p:style>
+              <p:txBody>
+                <a:bodyPr rtlCol="0" anchor="ctr"/>
+                <a:lstStyle/>
+                <a:p>
+                  <a:pPr algn="ctr"/>
+                  <a:endParaRPr lang="en-US"/>
+                </a:p>
+              </p:txBody>
+            </p:sp>
+            <p:sp>
+              <p:nvSpPr>
+                <p:cNvPr id="26" name="Oval 25">
+                  <a:extLst>
+                    <a:ext uri="{FF2B5EF4-FFF2-40B4-BE49-F238E27FC236}">
+                      <a16:creationId xmlns:a16="http://schemas.microsoft.com/office/drawing/2014/main" id="{2AE9AB16-30AD-0289-1A31-8B7E65972193}"/>
+                    </a:ext>
+                  </a:extLst>
+                </p:cNvPr>
+                <p:cNvSpPr/>
+                <p:nvPr/>
+              </p:nvSpPr>
+              <p:spPr>
+                <a:xfrm>
+                  <a:off x="6732691" y="3246417"/>
+                  <a:ext cx="490330" cy="514857"/>
+                </a:xfrm>
+                <a:prstGeom prst="ellipse">
+                  <a:avLst/>
+                </a:prstGeom>
+                <a:noFill/>
+                <a:ln w="6350">
+                  <a:solidFill>
+                    <a:schemeClr val="tx1"/>
+                  </a:solidFill>
+                </a:ln>
+              </p:spPr>
+              <p:style>
+                <a:lnRef idx="2">
+                  <a:schemeClr val="accent1">
+                    <a:shade val="50000"/>
+                  </a:schemeClr>
+                </a:lnRef>
+                <a:fillRef idx="1">
+                  <a:schemeClr val="accent1"/>
+                </a:fillRef>
+                <a:effectRef idx="0">
+                  <a:schemeClr val="accent1"/>
+                </a:effectRef>
+                <a:fontRef idx="minor">
+                  <a:schemeClr val="lt1"/>
+                </a:fontRef>
+              </p:style>
+              <p:txBody>
+                <a:bodyPr rtlCol="0" anchor="ctr"/>
+                <a:lstStyle/>
+                <a:p>
+                  <a:pPr algn="ctr"/>
+                  <a:endParaRPr lang="en-US"/>
+                </a:p>
+              </p:txBody>
+            </p:sp>
+            <p:grpSp>
+              <p:nvGrpSpPr>
+                <p:cNvPr id="75" name="Group 74">
+                  <a:extLst>
+                    <a:ext uri="{FF2B5EF4-FFF2-40B4-BE49-F238E27FC236}">
+                      <a16:creationId xmlns:a16="http://schemas.microsoft.com/office/drawing/2014/main" id="{56364D58-609E-51E0-1D57-EF18F9A5B03F}"/>
+                    </a:ext>
+                  </a:extLst>
+                </p:cNvPr>
+                <p:cNvGrpSpPr/>
+                <p:nvPr/>
+              </p:nvGrpSpPr>
+              <p:grpSpPr>
+                <a:xfrm>
+                  <a:off x="3643775" y="2811920"/>
+                  <a:ext cx="4942929" cy="1940120"/>
+                  <a:chOff x="1265380" y="2596539"/>
+                  <a:chExt cx="4608950" cy="1722853"/>
+                </a:xfrm>
+              </p:grpSpPr>
+              <p:cxnSp>
+                <p:nvCxnSpPr>
+                  <p:cNvPr id="41" name="Straight Connector 40">
+                    <a:extLst>
+                      <a:ext uri="{FF2B5EF4-FFF2-40B4-BE49-F238E27FC236}">
+                        <a16:creationId xmlns:a16="http://schemas.microsoft.com/office/drawing/2014/main" id="{B62968A8-D1F0-D9C4-9EA4-2AE27D282127}"/>
+                      </a:ext>
+                    </a:extLst>
+                  </p:cNvPr>
+                  <p:cNvCxnSpPr>
+                    <a:cxnSpLocks/>
+                  </p:cNvCxnSpPr>
+                  <p:nvPr/>
+                </p:nvCxnSpPr>
+                <p:spPr>
+                  <a:xfrm>
+                    <a:off x="4210804" y="3524171"/>
+                    <a:ext cx="907508" cy="0"/>
+                  </a:xfrm>
+                  <a:prstGeom prst="line">
+                    <a:avLst/>
+                  </a:prstGeom>
+                  <a:ln w="15875">
+                    <a:solidFill>
+                      <a:schemeClr val="tx1"/>
+                    </a:solidFill>
+                  </a:ln>
+                </p:spPr>
+                <p:style>
+                  <a:lnRef idx="1">
+                    <a:schemeClr val="accent1"/>
+                  </a:lnRef>
+                  <a:fillRef idx="0">
+                    <a:schemeClr val="accent1"/>
+                  </a:fillRef>
+                  <a:effectRef idx="0">
+                    <a:schemeClr val="accent1"/>
+                  </a:effectRef>
+                  <a:fontRef idx="minor">
+                    <a:schemeClr val="tx1"/>
+                  </a:fontRef>
+                </p:style>
+              </p:cxnSp>
+              <p:grpSp>
+                <p:nvGrpSpPr>
+                  <p:cNvPr id="72" name="Group 71">
+                    <a:extLst>
+                      <a:ext uri="{FF2B5EF4-FFF2-40B4-BE49-F238E27FC236}">
+                        <a16:creationId xmlns:a16="http://schemas.microsoft.com/office/drawing/2014/main" id="{32EF0F5E-B606-2BC2-DAB2-E1C9810D8B0E}"/>
+                      </a:ext>
+                    </a:extLst>
+                  </p:cNvPr>
+                  <p:cNvGrpSpPr/>
+                  <p:nvPr/>
+                </p:nvGrpSpPr>
+                <p:grpSpPr>
+                  <a:xfrm>
+                    <a:off x="1265380" y="2596539"/>
+                    <a:ext cx="4608950" cy="1722853"/>
+                    <a:chOff x="1265380" y="2596539"/>
+                    <a:chExt cx="4608950" cy="1722853"/>
+                  </a:xfrm>
+                </p:grpSpPr>
+                <p:cxnSp>
+                  <p:nvCxnSpPr>
+                    <p:cNvPr id="30" name="Straight Connector 29">
+                      <a:extLst>
+                        <a:ext uri="{FF2B5EF4-FFF2-40B4-BE49-F238E27FC236}">
+                          <a16:creationId xmlns:a16="http://schemas.microsoft.com/office/drawing/2014/main" id="{AD4C9BAB-3F0B-88CB-D017-C26E119BD7D9}"/>
+                        </a:ext>
+                      </a:extLst>
+                    </p:cNvPr>
+                    <p:cNvCxnSpPr/>
+                    <p:nvPr/>
+                  </p:nvCxnSpPr>
+                  <p:spPr>
+                    <a:xfrm>
+                      <a:off x="3368809" y="2596539"/>
+                      <a:ext cx="0" cy="160949"/>
+                    </a:xfrm>
+                    <a:prstGeom prst="line">
+                      <a:avLst/>
+                    </a:prstGeom>
+                    <a:ln w="15875">
+                      <a:solidFill>
+                        <a:schemeClr val="tx1"/>
+                      </a:solidFill>
+                    </a:ln>
+                  </p:spPr>
+                  <p:style>
+                    <a:lnRef idx="1">
+                      <a:schemeClr val="accent1"/>
+                    </a:lnRef>
+                    <a:fillRef idx="0">
+                      <a:schemeClr val="accent1"/>
+                    </a:fillRef>
+                    <a:effectRef idx="0">
+                      <a:schemeClr val="accent1"/>
+                    </a:effectRef>
+                    <a:fontRef idx="minor">
+                      <a:schemeClr val="tx1"/>
+                    </a:fontRef>
+                  </p:style>
+                </p:cxnSp>
+                <p:cxnSp>
+                  <p:nvCxnSpPr>
+                    <p:cNvPr id="33" name="Straight Connector 32">
+                      <a:extLst>
+                        <a:ext uri="{FF2B5EF4-FFF2-40B4-BE49-F238E27FC236}">
+                          <a16:creationId xmlns:a16="http://schemas.microsoft.com/office/drawing/2014/main" id="{C7C9BB22-4E17-4349-604B-939D24AB6007}"/>
+                        </a:ext>
+                      </a:extLst>
+                    </p:cNvPr>
+                    <p:cNvCxnSpPr/>
+                    <p:nvPr/>
+                  </p:nvCxnSpPr>
+                  <p:spPr>
+                    <a:xfrm>
+                      <a:off x="2223445" y="2757488"/>
+                      <a:ext cx="2150742" cy="0"/>
+                    </a:xfrm>
+                    <a:prstGeom prst="line">
+                      <a:avLst/>
+                    </a:prstGeom>
+                    <a:ln w="15875">
+                      <a:solidFill>
+                        <a:schemeClr val="tx1"/>
+                      </a:solidFill>
+                    </a:ln>
+                  </p:spPr>
+                  <p:style>
+                    <a:lnRef idx="1">
+                      <a:schemeClr val="accent1"/>
+                    </a:lnRef>
+                    <a:fillRef idx="0">
+                      <a:schemeClr val="accent1"/>
+                    </a:fillRef>
+                    <a:effectRef idx="0">
+                      <a:schemeClr val="accent1"/>
+                    </a:effectRef>
+                    <a:fontRef idx="minor">
+                      <a:schemeClr val="tx1"/>
+                    </a:fontRef>
+                  </p:style>
+                </p:cxnSp>
+                <p:cxnSp>
+                  <p:nvCxnSpPr>
+                    <p:cNvPr id="37" name="Straight Connector 36">
+                      <a:extLst>
+                        <a:ext uri="{FF2B5EF4-FFF2-40B4-BE49-F238E27FC236}">
+                          <a16:creationId xmlns:a16="http://schemas.microsoft.com/office/drawing/2014/main" id="{66A22EF5-5449-4D84-8D84-101D0F8E1DB0}"/>
+                        </a:ext>
+                      </a:extLst>
+                    </p:cNvPr>
+                    <p:cNvCxnSpPr>
+                      <a:cxnSpLocks/>
+                    </p:cNvCxnSpPr>
+                    <p:nvPr/>
+                  </p:nvCxnSpPr>
+                  <p:spPr>
+                    <a:xfrm>
+                      <a:off x="1617961" y="3496730"/>
+                      <a:ext cx="399744" cy="0"/>
+                    </a:xfrm>
+                    <a:prstGeom prst="line">
+                      <a:avLst/>
+                    </a:prstGeom>
+                    <a:ln w="15875">
+                      <a:solidFill>
+                        <a:schemeClr val="tx1"/>
+                      </a:solidFill>
+                    </a:ln>
+                  </p:spPr>
+                  <p:style>
+                    <a:lnRef idx="1">
+                      <a:schemeClr val="accent1"/>
+                    </a:lnRef>
+                    <a:fillRef idx="0">
+                      <a:schemeClr val="accent1"/>
+                    </a:fillRef>
+                    <a:effectRef idx="0">
+                      <a:schemeClr val="accent1"/>
+                    </a:effectRef>
+                    <a:fontRef idx="minor">
+                      <a:schemeClr val="tx1"/>
+                    </a:fontRef>
+                  </p:style>
+                </p:cxnSp>
+                <p:cxnSp>
+                  <p:nvCxnSpPr>
+                    <p:cNvPr id="39" name="Straight Connector 38">
+                      <a:extLst>
+                        <a:ext uri="{FF2B5EF4-FFF2-40B4-BE49-F238E27FC236}">
+                          <a16:creationId xmlns:a16="http://schemas.microsoft.com/office/drawing/2014/main" id="{4ADFB4FB-29FA-6E91-7754-024B0F76E0F6}"/>
+                        </a:ext>
+                      </a:extLst>
+                    </p:cNvPr>
+                    <p:cNvCxnSpPr>
+                      <a:cxnSpLocks/>
+                    </p:cNvCxnSpPr>
+                    <p:nvPr/>
+                  </p:nvCxnSpPr>
+                  <p:spPr>
+                    <a:xfrm>
+                      <a:off x="1265380" y="4210087"/>
+                      <a:ext cx="429273" cy="0"/>
+                    </a:xfrm>
+                    <a:prstGeom prst="line">
+                      <a:avLst/>
+                    </a:prstGeom>
+                    <a:ln w="15875">
+                      <a:solidFill>
+                        <a:schemeClr val="tx1"/>
+                      </a:solidFill>
+                    </a:ln>
+                  </p:spPr>
+                  <p:style>
+                    <a:lnRef idx="1">
+                      <a:schemeClr val="accent1"/>
+                    </a:lnRef>
+                    <a:fillRef idx="0">
+                      <a:schemeClr val="accent1"/>
+                    </a:fillRef>
+                    <a:effectRef idx="0">
+                      <a:schemeClr val="accent1"/>
+                    </a:effectRef>
+                    <a:fontRef idx="minor">
+                      <a:schemeClr val="tx1"/>
+                    </a:fontRef>
+                  </p:style>
+                </p:cxnSp>
+                <p:cxnSp>
+                  <p:nvCxnSpPr>
+                    <p:cNvPr id="40" name="Straight Connector 39">
+                      <a:extLst>
+                        <a:ext uri="{FF2B5EF4-FFF2-40B4-BE49-F238E27FC236}">
+                          <a16:creationId xmlns:a16="http://schemas.microsoft.com/office/drawing/2014/main" id="{A072AD7F-0C5F-8625-BEDE-95E899059427}"/>
+                        </a:ext>
+                      </a:extLst>
+                    </p:cNvPr>
+                    <p:cNvCxnSpPr>
+                      <a:cxnSpLocks/>
+                    </p:cNvCxnSpPr>
+                    <p:nvPr/>
+                  </p:nvCxnSpPr>
+                  <p:spPr>
+                    <a:xfrm>
+                      <a:off x="2707451" y="4104140"/>
+                      <a:ext cx="399744" cy="0"/>
+                    </a:xfrm>
+                    <a:prstGeom prst="line">
+                      <a:avLst/>
+                    </a:prstGeom>
+                    <a:ln w="15875">
+                      <a:solidFill>
+                        <a:schemeClr val="tx1"/>
+                      </a:solidFill>
+                    </a:ln>
+                  </p:spPr>
+                  <p:style>
+                    <a:lnRef idx="1">
+                      <a:schemeClr val="accent1"/>
+                    </a:lnRef>
+                    <a:fillRef idx="0">
+                      <a:schemeClr val="accent1"/>
+                    </a:fillRef>
+                    <a:effectRef idx="0">
+                      <a:schemeClr val="accent1"/>
+                    </a:effectRef>
+                    <a:fontRef idx="minor">
+                      <a:schemeClr val="tx1"/>
+                    </a:fontRef>
+                  </p:style>
+                </p:cxnSp>
+                <p:cxnSp>
+                  <p:nvCxnSpPr>
+                    <p:cNvPr id="43" name="Straight Connector 42">
+                      <a:extLst>
+                        <a:ext uri="{FF2B5EF4-FFF2-40B4-BE49-F238E27FC236}">
+                          <a16:creationId xmlns:a16="http://schemas.microsoft.com/office/drawing/2014/main" id="{2BCA5780-664C-CD44-6F72-031A87401299}"/>
+                        </a:ext>
+                      </a:extLst>
+                    </p:cNvPr>
+                    <p:cNvCxnSpPr>
+                      <a:cxnSpLocks/>
+                    </p:cNvCxnSpPr>
+                    <p:nvPr/>
+                  </p:nvCxnSpPr>
+                  <p:spPr>
+                    <a:xfrm>
+                      <a:off x="5008953" y="4238663"/>
+                      <a:ext cx="865377" cy="0"/>
+                    </a:xfrm>
+                    <a:prstGeom prst="line">
+                      <a:avLst/>
+                    </a:prstGeom>
+                    <a:ln w="15875">
+                      <a:solidFill>
+                        <a:schemeClr val="tx1"/>
+                      </a:solidFill>
+                    </a:ln>
+                  </p:spPr>
+                  <p:style>
+                    <a:lnRef idx="1">
+                      <a:schemeClr val="accent1"/>
+                    </a:lnRef>
+                    <a:fillRef idx="0">
+                      <a:schemeClr val="accent1"/>
+                    </a:fillRef>
+                    <a:effectRef idx="0">
+                      <a:schemeClr val="accent1"/>
+                    </a:effectRef>
+                    <a:fontRef idx="minor">
+                      <a:schemeClr val="tx1"/>
+                    </a:fontRef>
+                  </p:style>
+                </p:cxnSp>
+                <p:cxnSp>
+                  <p:nvCxnSpPr>
+                    <p:cNvPr id="45" name="Straight Connector 44">
+                      <a:extLst>
+                        <a:ext uri="{FF2B5EF4-FFF2-40B4-BE49-F238E27FC236}">
+                          <a16:creationId xmlns:a16="http://schemas.microsoft.com/office/drawing/2014/main" id="{6AA99585-287D-C8DD-4D51-260B891B224B}"/>
+                        </a:ext>
+                      </a:extLst>
+                    </p:cNvPr>
+                    <p:cNvCxnSpPr>
+                      <a:cxnSpLocks/>
+                    </p:cNvCxnSpPr>
+                    <p:nvPr/>
+                  </p:nvCxnSpPr>
+                  <p:spPr>
+                    <a:xfrm>
+                      <a:off x="3260225" y="2757488"/>
+                      <a:ext cx="2396" cy="760906"/>
+                    </a:xfrm>
+                    <a:prstGeom prst="line">
+                      <a:avLst/>
+                    </a:prstGeom>
+                    <a:ln w="15875">
+                      <a:solidFill>
+                        <a:schemeClr val="tx1"/>
+                      </a:solidFill>
+                    </a:ln>
+                  </p:spPr>
+                  <p:style>
+                    <a:lnRef idx="1">
+                      <a:schemeClr val="accent1"/>
+                    </a:lnRef>
+                    <a:fillRef idx="0">
+                      <a:schemeClr val="accent1"/>
+                    </a:fillRef>
+                    <a:effectRef idx="0">
+                      <a:schemeClr val="accent1"/>
+                    </a:effectRef>
+                    <a:fontRef idx="minor">
+                      <a:schemeClr val="tx1"/>
+                    </a:fontRef>
+                  </p:style>
+                </p:cxnSp>
+                <p:cxnSp>
+                  <p:nvCxnSpPr>
+                    <p:cNvPr id="47" name="Straight Connector 46">
+                      <a:extLst>
+                        <a:ext uri="{FF2B5EF4-FFF2-40B4-BE49-F238E27FC236}">
+                          <a16:creationId xmlns:a16="http://schemas.microsoft.com/office/drawing/2014/main" id="{1AD9E2A1-303D-23DE-8B29-5E5410B2580E}"/>
+                        </a:ext>
+                      </a:extLst>
+                    </p:cNvPr>
+                    <p:cNvCxnSpPr>
+                      <a:cxnSpLocks/>
+                    </p:cNvCxnSpPr>
+                    <p:nvPr/>
+                  </p:nvCxnSpPr>
+                  <p:spPr>
+                    <a:xfrm>
+                      <a:off x="1817833" y="3492089"/>
+                      <a:ext cx="0" cy="110782"/>
+                    </a:xfrm>
+                    <a:prstGeom prst="line">
+                      <a:avLst/>
+                    </a:prstGeom>
+                    <a:ln w="15875">
+                      <a:solidFill>
+                        <a:schemeClr val="tx1"/>
+                      </a:solidFill>
+                    </a:ln>
+                  </p:spPr>
+                  <p:style>
+                    <a:lnRef idx="1">
+                      <a:schemeClr val="accent1"/>
+                    </a:lnRef>
+                    <a:fillRef idx="0">
+                      <a:schemeClr val="accent1"/>
+                    </a:fillRef>
+                    <a:effectRef idx="0">
+                      <a:schemeClr val="accent1"/>
+                    </a:effectRef>
+                    <a:fontRef idx="minor">
+                      <a:schemeClr val="tx1"/>
+                    </a:fontRef>
+                  </p:style>
+                </p:cxnSp>
+                <p:cxnSp>
+                  <p:nvCxnSpPr>
+                    <p:cNvPr id="51" name="Straight Connector 50">
+                      <a:extLst>
+                        <a:ext uri="{FF2B5EF4-FFF2-40B4-BE49-F238E27FC236}">
+                          <a16:creationId xmlns:a16="http://schemas.microsoft.com/office/drawing/2014/main" id="{BDFC6486-131C-A72B-2AC3-9B7AB0A1904B}"/>
+                        </a:ext>
+                      </a:extLst>
+                    </p:cNvPr>
+                    <p:cNvCxnSpPr>
+                      <a:cxnSpLocks/>
+                    </p:cNvCxnSpPr>
+                    <p:nvPr/>
+                  </p:nvCxnSpPr>
+                  <p:spPr>
+                    <a:xfrm>
+                      <a:off x="1488913" y="4210087"/>
+                      <a:ext cx="0" cy="109305"/>
+                    </a:xfrm>
+                    <a:prstGeom prst="line">
+                      <a:avLst/>
+                    </a:prstGeom>
+                    <a:ln w="15875">
+                      <a:solidFill>
+                        <a:schemeClr val="tx1"/>
+                      </a:solidFill>
+                    </a:ln>
+                  </p:spPr>
+                  <p:style>
+                    <a:lnRef idx="1">
+                      <a:schemeClr val="accent1"/>
+                    </a:lnRef>
+                    <a:fillRef idx="0">
+                      <a:schemeClr val="accent1"/>
+                    </a:fillRef>
+                    <a:effectRef idx="0">
+                      <a:schemeClr val="accent1"/>
+                    </a:effectRef>
+                    <a:fontRef idx="minor">
+                      <a:schemeClr val="tx1"/>
+                    </a:fontRef>
+                  </p:style>
+                </p:cxnSp>
+                <p:cxnSp>
+                  <p:nvCxnSpPr>
+                    <p:cNvPr id="52" name="Straight Connector 51">
+                      <a:extLst>
+                        <a:ext uri="{FF2B5EF4-FFF2-40B4-BE49-F238E27FC236}">
+                          <a16:creationId xmlns:a16="http://schemas.microsoft.com/office/drawing/2014/main" id="{FB34DB8D-C906-2DC3-5ACC-FB983292EFB2}"/>
+                        </a:ext>
+                      </a:extLst>
+                    </p:cNvPr>
+                    <p:cNvCxnSpPr>
+                      <a:cxnSpLocks/>
+                    </p:cNvCxnSpPr>
+                    <p:nvPr/>
+                  </p:nvCxnSpPr>
+                  <p:spPr>
+                    <a:xfrm>
+                      <a:off x="2903947" y="4105869"/>
+                      <a:ext cx="28" cy="160469"/>
+                    </a:xfrm>
+                    <a:prstGeom prst="line">
+                      <a:avLst/>
+                    </a:prstGeom>
+                    <a:ln w="15875">
+                      <a:solidFill>
+                        <a:schemeClr val="tx1"/>
+                      </a:solidFill>
+                    </a:ln>
+                  </p:spPr>
+                  <p:style>
+                    <a:lnRef idx="1">
+                      <a:schemeClr val="accent1"/>
+                    </a:lnRef>
+                    <a:fillRef idx="0">
+                      <a:schemeClr val="accent1"/>
+                    </a:fillRef>
+                    <a:effectRef idx="0">
+                      <a:schemeClr val="accent1"/>
+                    </a:effectRef>
+                    <a:fontRef idx="minor">
+                      <a:schemeClr val="tx1"/>
+                    </a:fontRef>
+                  </p:style>
+                </p:cxnSp>
+                <p:cxnSp>
+                  <p:nvCxnSpPr>
+                    <p:cNvPr id="55" name="Straight Connector 54">
+                      <a:extLst>
+                        <a:ext uri="{FF2B5EF4-FFF2-40B4-BE49-F238E27FC236}">
+                          <a16:creationId xmlns:a16="http://schemas.microsoft.com/office/drawing/2014/main" id="{0646D3BA-E7D6-F8F9-A552-690BCAB32613}"/>
+                        </a:ext>
+                      </a:extLst>
+                    </p:cNvPr>
+                    <p:cNvCxnSpPr/>
+                    <p:nvPr/>
+                  </p:nvCxnSpPr>
+                  <p:spPr>
+                    <a:xfrm>
+                      <a:off x="2221037" y="2757476"/>
+                      <a:ext cx="0" cy="160949"/>
+                    </a:xfrm>
+                    <a:prstGeom prst="line">
+                      <a:avLst/>
+                    </a:prstGeom>
+                    <a:ln w="15875">
+                      <a:solidFill>
+                        <a:schemeClr val="tx1"/>
+                      </a:solidFill>
+                    </a:ln>
+                  </p:spPr>
+                  <p:style>
+                    <a:lnRef idx="1">
+                      <a:schemeClr val="accent1"/>
+                    </a:lnRef>
+                    <a:fillRef idx="0">
+                      <a:schemeClr val="accent1"/>
+                    </a:fillRef>
+                    <a:effectRef idx="0">
+                      <a:schemeClr val="accent1"/>
+                    </a:effectRef>
+                    <a:fontRef idx="minor">
+                      <a:schemeClr val="tx1"/>
+                    </a:fontRef>
+                  </p:style>
+                </p:cxnSp>
+                <p:cxnSp>
+                  <p:nvCxnSpPr>
+                    <p:cNvPr id="56" name="Straight Connector 55">
+                      <a:extLst>
+                        <a:ext uri="{FF2B5EF4-FFF2-40B4-BE49-F238E27FC236}">
+                          <a16:creationId xmlns:a16="http://schemas.microsoft.com/office/drawing/2014/main" id="{5097F87B-43A3-27F4-A86B-164AB2A77E8A}"/>
+                        </a:ext>
+                      </a:extLst>
+                    </p:cNvPr>
+                    <p:cNvCxnSpPr/>
+                    <p:nvPr/>
+                  </p:nvCxnSpPr>
+                  <p:spPr>
+                    <a:xfrm>
+                      <a:off x="4376669" y="2755676"/>
+                      <a:ext cx="0" cy="160949"/>
+                    </a:xfrm>
+                    <a:prstGeom prst="line">
+                      <a:avLst/>
+                    </a:prstGeom>
+                    <a:ln w="15875">
+                      <a:solidFill>
+                        <a:schemeClr val="tx1"/>
+                      </a:solidFill>
+                    </a:ln>
+                  </p:spPr>
+                  <p:style>
+                    <a:lnRef idx="1">
+                      <a:schemeClr val="accent1"/>
+                    </a:lnRef>
+                    <a:fillRef idx="0">
+                      <a:schemeClr val="accent1"/>
+                    </a:fillRef>
+                    <a:effectRef idx="0">
+                      <a:schemeClr val="accent1"/>
+                    </a:effectRef>
+                    <a:fontRef idx="minor">
+                      <a:schemeClr val="tx1"/>
+                    </a:fontRef>
+                  </p:style>
+                </p:cxnSp>
+                <p:cxnSp>
+                  <p:nvCxnSpPr>
+                    <p:cNvPr id="58" name="Straight Connector 57">
+                      <a:extLst>
+                        <a:ext uri="{FF2B5EF4-FFF2-40B4-BE49-F238E27FC236}">
+                          <a16:creationId xmlns:a16="http://schemas.microsoft.com/office/drawing/2014/main" id="{A2CBE7F8-22DB-8225-5BF4-026E00038CFC}"/>
+                        </a:ext>
+                      </a:extLst>
+                    </p:cNvPr>
+                    <p:cNvCxnSpPr>
+                      <a:cxnSpLocks/>
+                    </p:cNvCxnSpPr>
+                    <p:nvPr/>
+                  </p:nvCxnSpPr>
+                  <p:spPr>
+                    <a:xfrm>
+                      <a:off x="4642062" y="3429000"/>
+                      <a:ext cx="0" cy="95171"/>
+                    </a:xfrm>
+                    <a:prstGeom prst="line">
+                      <a:avLst/>
+                    </a:prstGeom>
+                    <a:ln w="15875">
+                      <a:solidFill>
+                        <a:schemeClr val="tx1"/>
+                      </a:solidFill>
+                    </a:ln>
+                  </p:spPr>
+                  <p:style>
+                    <a:lnRef idx="1">
+                      <a:schemeClr val="accent1"/>
+                    </a:lnRef>
+                    <a:fillRef idx="0">
+                      <a:schemeClr val="accent1"/>
+                    </a:fillRef>
+                    <a:effectRef idx="0">
+                      <a:schemeClr val="accent1"/>
+                    </a:effectRef>
+                    <a:fontRef idx="minor">
+                      <a:schemeClr val="tx1"/>
+                    </a:fontRef>
+                  </p:style>
+                </p:cxnSp>
+                <p:cxnSp>
+                  <p:nvCxnSpPr>
+                    <p:cNvPr id="61" name="Straight Connector 60">
+                      <a:extLst>
+                        <a:ext uri="{FF2B5EF4-FFF2-40B4-BE49-F238E27FC236}">
+                          <a16:creationId xmlns:a16="http://schemas.microsoft.com/office/drawing/2014/main" id="{41878D66-62AC-B9B2-7329-D2D16039FFDA}"/>
+                        </a:ext>
+                      </a:extLst>
+                    </p:cNvPr>
+                    <p:cNvCxnSpPr>
+                      <a:cxnSpLocks/>
+                    </p:cNvCxnSpPr>
+                    <p:nvPr/>
+                  </p:nvCxnSpPr>
+                  <p:spPr>
+                    <a:xfrm>
+                      <a:off x="5441641" y="4143492"/>
+                      <a:ext cx="0" cy="95171"/>
+                    </a:xfrm>
+                    <a:prstGeom prst="line">
+                      <a:avLst/>
+                    </a:prstGeom>
+                    <a:ln w="15875">
+                      <a:solidFill>
+                        <a:schemeClr val="tx1"/>
+                      </a:solidFill>
+                    </a:ln>
+                  </p:spPr>
+                  <p:style>
+                    <a:lnRef idx="1">
+                      <a:schemeClr val="accent1"/>
+                    </a:lnRef>
+                    <a:fillRef idx="0">
+                      <a:schemeClr val="accent1"/>
+                    </a:fillRef>
+                    <a:effectRef idx="0">
+                      <a:schemeClr val="accent1"/>
+                    </a:effectRef>
+                    <a:fontRef idx="minor">
+                      <a:schemeClr val="tx1"/>
+                    </a:fontRef>
+                  </p:style>
+                </p:cxnSp>
+                <p:cxnSp>
+                  <p:nvCxnSpPr>
+                    <p:cNvPr id="66" name="Straight Connector 65">
+                      <a:extLst>
+                        <a:ext uri="{FF2B5EF4-FFF2-40B4-BE49-F238E27FC236}">
+                          <a16:creationId xmlns:a16="http://schemas.microsoft.com/office/drawing/2014/main" id="{A441C747-23E7-AB0B-04A2-361DF68CD4AA}"/>
+                        </a:ext>
+                      </a:extLst>
+                    </p:cNvPr>
+                    <p:cNvCxnSpPr>
+                      <a:cxnSpLocks/>
+                    </p:cNvCxnSpPr>
+                    <p:nvPr/>
+                  </p:nvCxnSpPr>
+                  <p:spPr>
+                    <a:xfrm>
+                      <a:off x="4216612" y="3524250"/>
+                      <a:ext cx="0" cy="95171"/>
+                    </a:xfrm>
+                    <a:prstGeom prst="line">
+                      <a:avLst/>
+                    </a:prstGeom>
+                    <a:ln w="15875">
+                      <a:solidFill>
+                        <a:schemeClr val="tx1"/>
+                      </a:solidFill>
+                    </a:ln>
+                  </p:spPr>
+                  <p:style>
+                    <a:lnRef idx="1">
+                      <a:schemeClr val="accent1"/>
+                    </a:lnRef>
+                    <a:fillRef idx="0">
+                      <a:schemeClr val="accent1"/>
+                    </a:fillRef>
+                    <a:effectRef idx="0">
+                      <a:schemeClr val="accent1"/>
+                    </a:effectRef>
+                    <a:fontRef idx="minor">
+                      <a:schemeClr val="tx1"/>
+                    </a:fontRef>
+                  </p:style>
+                </p:cxnSp>
+                <p:cxnSp>
+                  <p:nvCxnSpPr>
+                    <p:cNvPr id="67" name="Straight Connector 66">
+                      <a:extLst>
+                        <a:ext uri="{FF2B5EF4-FFF2-40B4-BE49-F238E27FC236}">
+                          <a16:creationId xmlns:a16="http://schemas.microsoft.com/office/drawing/2014/main" id="{5C3BB195-4BB1-20A0-EBEB-1F39555EF68F}"/>
+                        </a:ext>
+                      </a:extLst>
+                    </p:cNvPr>
+                    <p:cNvCxnSpPr>
+                      <a:cxnSpLocks/>
+                    </p:cNvCxnSpPr>
+                    <p:nvPr/>
+                  </p:nvCxnSpPr>
+                  <p:spPr>
+                    <a:xfrm>
+                      <a:off x="5118312" y="3524250"/>
+                      <a:ext cx="0" cy="95171"/>
+                    </a:xfrm>
+                    <a:prstGeom prst="line">
+                      <a:avLst/>
+                    </a:prstGeom>
+                    <a:ln w="15875">
+                      <a:solidFill>
+                        <a:schemeClr val="tx1"/>
+                      </a:solidFill>
+                    </a:ln>
+                  </p:spPr>
+                  <p:style>
+                    <a:lnRef idx="1">
+                      <a:schemeClr val="accent1"/>
+                    </a:lnRef>
+                    <a:fillRef idx="0">
+                      <a:schemeClr val="accent1"/>
+                    </a:fillRef>
+                    <a:effectRef idx="0">
+                      <a:schemeClr val="accent1"/>
+                    </a:effectRef>
+                    <a:fontRef idx="minor">
+                      <a:schemeClr val="tx1"/>
+                    </a:fontRef>
+                  </p:style>
+                </p:cxnSp>
+              </p:grpSp>
+            </p:grpSp>
+            <p:sp>
+              <p:nvSpPr>
+                <p:cNvPr id="77" name="Rectangle 76">
+                  <a:extLst>
+                    <a:ext uri="{FF2B5EF4-FFF2-40B4-BE49-F238E27FC236}">
+                      <a16:creationId xmlns:a16="http://schemas.microsoft.com/office/drawing/2014/main" id="{7F393069-4B7F-CC07-90B8-87C0EDC2D910}"/>
+                    </a:ext>
+                  </a:extLst>
+                </p:cNvPr>
+                <p:cNvSpPr/>
+                <p:nvPr/>
+              </p:nvSpPr>
+              <p:spPr>
+                <a:xfrm>
+                  <a:off x="5525464" y="2343998"/>
+                  <a:ext cx="225552" cy="463371"/>
+                </a:xfrm>
+                <a:prstGeom prst="rect">
+                  <a:avLst/>
+                </a:prstGeom>
+                <a:solidFill>
+                  <a:srgbClr val="063E83"/>
+                </a:solidFill>
+                <a:ln w="0">
+                  <a:solidFill>
+                    <a:srgbClr val="063E83"/>
+                  </a:solidFill>
+                </a:ln>
+              </p:spPr>
+              <p:style>
+                <a:lnRef idx="2">
+                  <a:schemeClr val="accent1">
+                    <a:shade val="50000"/>
+                  </a:schemeClr>
+                </a:lnRef>
+                <a:fillRef idx="1">
+                  <a:schemeClr val="accent1"/>
+                </a:fillRef>
+                <a:effectRef idx="0">
+                  <a:schemeClr val="accent1"/>
+                </a:effectRef>
+                <a:fontRef idx="minor">
+                  <a:schemeClr val="lt1"/>
+                </a:fontRef>
+              </p:style>
+              <p:txBody>
+                <a:bodyPr rtlCol="0" anchor="ctr"/>
+                <a:lstStyle/>
+                <a:p>
+                  <a:pPr algn="ctr"/>
+                  <a:endParaRPr lang="en-US"/>
+                </a:p>
+              </p:txBody>
+            </p:sp>
+            <p:sp>
+              <p:nvSpPr>
+                <p:cNvPr id="79" name="Rectangle 78">
+                  <a:extLst>
+                    <a:ext uri="{FF2B5EF4-FFF2-40B4-BE49-F238E27FC236}">
+                      <a16:creationId xmlns:a16="http://schemas.microsoft.com/office/drawing/2014/main" id="{D038EC8C-FB33-0ED3-A402-4FD1D35092C4}"/>
+                    </a:ext>
+                  </a:extLst>
+                </p:cNvPr>
+                <p:cNvSpPr/>
+                <p:nvPr/>
+              </p:nvSpPr>
+              <p:spPr>
+                <a:xfrm>
+                  <a:off x="3878603" y="4866553"/>
+                  <a:ext cx="225552" cy="463371"/>
+                </a:xfrm>
+                <a:prstGeom prst="rect">
+                  <a:avLst/>
+                </a:prstGeom>
+                <a:solidFill>
+                  <a:srgbClr val="063E83"/>
+                </a:solidFill>
+                <a:ln w="0">
+                  <a:solidFill>
+                    <a:srgbClr val="063E83"/>
+                  </a:solidFill>
+                </a:ln>
+              </p:spPr>
+              <p:style>
+                <a:lnRef idx="2">
+                  <a:schemeClr val="accent1">
+                    <a:shade val="50000"/>
+                  </a:schemeClr>
+                </a:lnRef>
+                <a:fillRef idx="1">
+                  <a:schemeClr val="accent1"/>
+                </a:fillRef>
+                <a:effectRef idx="0">
+                  <a:schemeClr val="accent1"/>
+                </a:effectRef>
+                <a:fontRef idx="minor">
+                  <a:schemeClr val="lt1"/>
+                </a:fontRef>
+              </p:style>
+              <p:txBody>
+                <a:bodyPr rtlCol="0" anchor="ctr"/>
+                <a:lstStyle/>
+                <a:p>
+                  <a:pPr algn="ctr"/>
+                  <a:endParaRPr lang="en-US"/>
+                </a:p>
+              </p:txBody>
+            </p:sp>
+            <p:sp>
+              <p:nvSpPr>
+                <p:cNvPr id="82" name="Pie 81">
+                  <a:extLst>
+                    <a:ext uri="{FF2B5EF4-FFF2-40B4-BE49-F238E27FC236}">
+                      <a16:creationId xmlns:a16="http://schemas.microsoft.com/office/drawing/2014/main" id="{AEE7234F-4315-E1F5-4B79-B14568D733C9}"/>
+                    </a:ext>
+                  </a:extLst>
+                </p:cNvPr>
+                <p:cNvSpPr/>
+                <p:nvPr/>
+              </p:nvSpPr>
+              <p:spPr>
+                <a:xfrm>
+                  <a:off x="6076284" y="2307129"/>
+                  <a:ext cx="490330" cy="514857"/>
+                </a:xfrm>
+                <a:prstGeom prst="pie">
+                  <a:avLst>
+                    <a:gd name="adj1" fmla="val 16184654"/>
+                    <a:gd name="adj2" fmla="val 5416591"/>
+                  </a:avLst>
+                </a:prstGeom>
+                <a:solidFill>
+                  <a:srgbClr val="063E83"/>
+                </a:solidFill>
+                <a:ln>
+                  <a:noFill/>
+                </a:ln>
+              </p:spPr>
+              <p:style>
+                <a:lnRef idx="2">
+                  <a:schemeClr val="accent1">
+                    <a:shade val="50000"/>
+                  </a:schemeClr>
+                </a:lnRef>
+                <a:fillRef idx="1">
+                  <a:schemeClr val="accent1"/>
+                </a:fillRef>
+                <a:effectRef idx="0">
+                  <a:schemeClr val="accent1"/>
+                </a:effectRef>
+                <a:fontRef idx="minor">
+                  <a:schemeClr val="lt1"/>
+                </a:fontRef>
+              </p:style>
+              <p:txBody>
+                <a:bodyPr rtlCol="0" anchor="ctr"/>
+                <a:lstStyle/>
+                <a:p>
+                  <a:pPr algn="ctr"/>
+                  <a:endParaRPr lang="en-US">
+                    <a:solidFill>
+                      <a:schemeClr val="tx1"/>
+                    </a:solidFill>
+                  </a:endParaRPr>
+                </a:p>
+              </p:txBody>
+            </p:sp>
+            <p:sp>
+              <p:nvSpPr>
+                <p:cNvPr id="83" name="Pie 82">
+                  <a:extLst>
+                    <a:ext uri="{FF2B5EF4-FFF2-40B4-BE49-F238E27FC236}">
+                      <a16:creationId xmlns:a16="http://schemas.microsoft.com/office/drawing/2014/main" id="{EAD6E640-C0D4-A363-4BE7-82157AD6A310}"/>
+                    </a:ext>
+                  </a:extLst>
+                </p:cNvPr>
+                <p:cNvSpPr/>
+                <p:nvPr/>
+              </p:nvSpPr>
+              <p:spPr>
+                <a:xfrm>
+                  <a:off x="6735288" y="3247804"/>
+                  <a:ext cx="490330" cy="514857"/>
+                </a:xfrm>
+                <a:prstGeom prst="pie">
+                  <a:avLst>
+                    <a:gd name="adj1" fmla="val 16184654"/>
+                    <a:gd name="adj2" fmla="val 5416591"/>
+                  </a:avLst>
+                </a:prstGeom>
+                <a:solidFill>
+                  <a:srgbClr val="063E83"/>
+                </a:solidFill>
+                <a:ln w="6350">
+                  <a:solidFill>
+                    <a:schemeClr val="tx1"/>
+                  </a:solidFill>
+                </a:ln>
+              </p:spPr>
+              <p:style>
+                <a:lnRef idx="2">
+                  <a:schemeClr val="accent1">
+                    <a:shade val="50000"/>
+                  </a:schemeClr>
+                </a:lnRef>
+                <a:fillRef idx="1">
+                  <a:schemeClr val="accent1"/>
+                </a:fillRef>
+                <a:effectRef idx="0">
+                  <a:schemeClr val="accent1"/>
+                </a:effectRef>
+                <a:fontRef idx="minor">
+                  <a:schemeClr val="lt1"/>
+                </a:fontRef>
+              </p:style>
+              <p:txBody>
+                <a:bodyPr rtlCol="0" anchor="ctr"/>
+                <a:lstStyle/>
+                <a:p>
+                  <a:pPr algn="ctr"/>
+                  <a:endParaRPr lang="en-US">
+                    <a:solidFill>
+                      <a:schemeClr val="tx1"/>
+                    </a:solidFill>
+                  </a:endParaRPr>
+                </a:p>
+              </p:txBody>
+            </p:sp>
+            <p:sp>
+              <p:nvSpPr>
+                <p:cNvPr id="84" name="Pie 83">
+                  <a:extLst>
+                    <a:ext uri="{FF2B5EF4-FFF2-40B4-BE49-F238E27FC236}">
+                      <a16:creationId xmlns:a16="http://schemas.microsoft.com/office/drawing/2014/main" id="{0436BBEC-45AF-A7C2-2010-8A423ED4B067}"/>
+                    </a:ext>
+                  </a:extLst>
+                </p:cNvPr>
+                <p:cNvSpPr/>
+                <p:nvPr/>
+              </p:nvSpPr>
+              <p:spPr>
+                <a:xfrm>
+                  <a:off x="7571133" y="4040082"/>
+                  <a:ext cx="490330" cy="514857"/>
+                </a:xfrm>
+                <a:prstGeom prst="pie">
+                  <a:avLst>
+                    <a:gd name="adj1" fmla="val 16184654"/>
+                    <a:gd name="adj2" fmla="val 5416591"/>
+                  </a:avLst>
+                </a:prstGeom>
+                <a:solidFill>
+                  <a:srgbClr val="063E83"/>
+                </a:solidFill>
+                <a:ln>
+                  <a:noFill/>
+                </a:ln>
+              </p:spPr>
+              <p:style>
+                <a:lnRef idx="2">
+                  <a:schemeClr val="accent1">
+                    <a:shade val="50000"/>
+                  </a:schemeClr>
+                </a:lnRef>
+                <a:fillRef idx="1">
+                  <a:schemeClr val="accent1"/>
+                </a:fillRef>
+                <a:effectRef idx="0">
+                  <a:schemeClr val="accent1"/>
+                </a:effectRef>
+                <a:fontRef idx="minor">
+                  <a:schemeClr val="lt1"/>
+                </a:fontRef>
+              </p:style>
+              <p:txBody>
+                <a:bodyPr rtlCol="0" anchor="ctr"/>
+                <a:lstStyle/>
+                <a:p>
+                  <a:pPr algn="ctr"/>
+                  <a:endParaRPr lang="en-US">
+                    <a:solidFill>
+                      <a:schemeClr val="tx1"/>
+                    </a:solidFill>
+                  </a:endParaRPr>
+                </a:p>
+              </p:txBody>
+            </p:sp>
+          </p:grpSp>
+        </p:grpSp>
+        <p:grpSp>
+          <p:nvGrpSpPr>
+            <p:cNvPr id="6" name="Group 5">
+              <a:extLst>
+                <a:ext uri="{FF2B5EF4-FFF2-40B4-BE49-F238E27FC236}">
+                  <a16:creationId xmlns:a16="http://schemas.microsoft.com/office/drawing/2014/main" id="{8BB686D7-79E9-CB0A-734A-A843BFDB910D}"/>
+                </a:ext>
+              </a:extLst>
+            </p:cNvPr>
+            <p:cNvGrpSpPr/>
+            <p:nvPr/>
+          </p:nvGrpSpPr>
+          <p:grpSpPr>
+            <a:xfrm>
+              <a:off x="9112420" y="2343998"/>
+              <a:ext cx="2424116" cy="3014572"/>
+              <a:chOff x="9112420" y="2343998"/>
+              <a:chExt cx="2424116" cy="3014572"/>
+            </a:xfrm>
+          </p:grpSpPr>
+          <p:sp>
+            <p:nvSpPr>
+              <p:cNvPr id="85" name="TextBox 84">
+                <a:extLst>
+                  <a:ext uri="{FF2B5EF4-FFF2-40B4-BE49-F238E27FC236}">
+                    <a16:creationId xmlns:a16="http://schemas.microsoft.com/office/drawing/2014/main" id="{DAE2E8BA-6AE3-0A91-634B-28F0E2E035EA}"/>
+                  </a:ext>
+                </a:extLst>
+              </p:cNvPr>
+              <p:cNvSpPr txBox="1"/>
+              <p:nvPr/>
+            </p:nvSpPr>
+            <p:spPr>
+              <a:xfrm>
+                <a:off x="9462938" y="2347919"/>
+                <a:ext cx="728861" cy="276999"/>
+              </a:xfrm>
+              <a:prstGeom prst="rect">
+                <a:avLst/>
+              </a:prstGeom>
+              <a:noFill/>
+            </p:spPr>
+            <p:txBody>
+              <a:bodyPr wrap="square" rtlCol="0">
+                <a:spAutoFit/>
+              </a:bodyPr>
+              <a:lstStyle/>
+              <a:p>
+                <a:r>
+                  <a:rPr lang="en-US" sz="1200" dirty="0"/>
+                  <a:t>Female</a:t>
+                </a:r>
+              </a:p>
+            </p:txBody>
+          </p:sp>
+          <p:sp>
+            <p:nvSpPr>
+              <p:cNvPr id="86" name="TextBox 85">
+                <a:extLst>
+                  <a:ext uri="{FF2B5EF4-FFF2-40B4-BE49-F238E27FC236}">
+                    <a16:creationId xmlns:a16="http://schemas.microsoft.com/office/drawing/2014/main" id="{2E11F689-3B0A-73E5-AE44-A1C3D8A73C10}"/>
+                  </a:ext>
+                </a:extLst>
+              </p:cNvPr>
+              <p:cNvSpPr txBox="1"/>
+              <p:nvPr/>
+            </p:nvSpPr>
+            <p:spPr>
+              <a:xfrm>
+                <a:off x="9462938" y="3027343"/>
+                <a:ext cx="728861" cy="276999"/>
+              </a:xfrm>
+              <a:prstGeom prst="rect">
+                <a:avLst/>
+              </a:prstGeom>
+              <a:noFill/>
+            </p:spPr>
+            <p:txBody>
+              <a:bodyPr wrap="square" rtlCol="0">
+                <a:spAutoFit/>
+              </a:bodyPr>
+              <a:lstStyle/>
+              <a:p>
+                <a:r>
+                  <a:rPr lang="en-US" sz="1200" dirty="0"/>
+                  <a:t>Male</a:t>
+                </a:r>
+              </a:p>
+            </p:txBody>
+          </p:sp>
+          <p:sp>
+            <p:nvSpPr>
+              <p:cNvPr id="17" name="Rectangle 16">
+                <a:extLst>
+                  <a:ext uri="{FF2B5EF4-FFF2-40B4-BE49-F238E27FC236}">
+                    <a16:creationId xmlns:a16="http://schemas.microsoft.com/office/drawing/2014/main" id="{5102B743-1F0E-3DAF-41BD-076CDB0F3DA9}"/>
+                  </a:ext>
+                </a:extLst>
+              </p:cNvPr>
+              <p:cNvSpPr/>
+              <p:nvPr/>
+            </p:nvSpPr>
+            <p:spPr>
+              <a:xfrm>
+                <a:off x="9112420" y="3696826"/>
+                <a:ext cx="294198" cy="308914"/>
+              </a:xfrm>
+              <a:prstGeom prst="rect">
+                <a:avLst/>
+              </a:prstGeom>
+              <a:noFill/>
+              <a:ln w="6350">
+                <a:solidFill>
+                  <a:schemeClr val="tx1"/>
+                </a:solidFill>
+              </a:ln>
+            </p:spPr>
+            <p:style>
+              <a:lnRef idx="2">
+                <a:schemeClr val="accent1">
+                  <a:shade val="50000"/>
+                </a:schemeClr>
+              </a:lnRef>
+              <a:fillRef idx="1">
+                <a:schemeClr val="accent1"/>
+              </a:fillRef>
+              <a:effectRef idx="0">
+                <a:schemeClr val="accent1"/>
+              </a:effectRef>
+              <a:fontRef idx="minor">
+                <a:schemeClr val="lt1"/>
+              </a:fontRef>
+            </p:style>
+            <p:txBody>
+              <a:bodyPr rtlCol="0" anchor="ctr"/>
+              <a:lstStyle/>
+              <a:p>
+                <a:pPr algn="ctr"/>
+                <a:endParaRPr lang="en-US"/>
+              </a:p>
+            </p:txBody>
+          </p:sp>
+          <p:sp>
+            <p:nvSpPr>
+              <p:cNvPr id="19" name="Rectangle 18">
+                <a:extLst>
+                  <a:ext uri="{FF2B5EF4-FFF2-40B4-BE49-F238E27FC236}">
+                    <a16:creationId xmlns:a16="http://schemas.microsoft.com/office/drawing/2014/main" id="{32B99FF2-26BC-4DC6-35E8-73987DC4DE8A}"/>
+                  </a:ext>
+                </a:extLst>
+              </p:cNvPr>
+              <p:cNvSpPr/>
+              <p:nvPr/>
+            </p:nvSpPr>
+            <p:spPr>
+              <a:xfrm>
+                <a:off x="9112420" y="5049656"/>
+                <a:ext cx="294198" cy="308914"/>
+              </a:xfrm>
+              <a:prstGeom prst="rect">
+                <a:avLst/>
+              </a:prstGeom>
+              <a:solidFill>
+                <a:srgbClr val="063E83"/>
+              </a:solidFill>
+              <a:ln w="6350">
+                <a:solidFill>
+                  <a:schemeClr val="tx1"/>
+                </a:solidFill>
+              </a:ln>
+            </p:spPr>
+            <p:style>
+              <a:lnRef idx="2">
+                <a:schemeClr val="accent1">
+                  <a:shade val="50000"/>
+                </a:schemeClr>
+              </a:lnRef>
+              <a:fillRef idx="1">
+                <a:schemeClr val="accent1"/>
+              </a:fillRef>
+              <a:effectRef idx="0">
+                <a:schemeClr val="accent1"/>
+              </a:effectRef>
+              <a:fontRef idx="minor">
+                <a:schemeClr val="lt1"/>
+              </a:fontRef>
+            </p:style>
+            <p:txBody>
+              <a:bodyPr rtlCol="0" anchor="ctr"/>
+              <a:lstStyle/>
+              <a:p>
+                <a:pPr algn="ctr"/>
+                <a:endParaRPr lang="en-US"/>
+              </a:p>
+            </p:txBody>
+          </p:sp>
+          <p:sp>
+            <p:nvSpPr>
+              <p:cNvPr id="70" name="Rectangle 69">
+                <a:extLst>
+                  <a:ext uri="{FF2B5EF4-FFF2-40B4-BE49-F238E27FC236}">
+                    <a16:creationId xmlns:a16="http://schemas.microsoft.com/office/drawing/2014/main" id="{DDD89E31-39F2-62EA-728B-0314FE402BD9}"/>
+                  </a:ext>
+                </a:extLst>
+              </p:cNvPr>
+              <p:cNvSpPr/>
+              <p:nvPr/>
+            </p:nvSpPr>
+            <p:spPr>
+              <a:xfrm>
+                <a:off x="9112420" y="3020412"/>
+                <a:ext cx="294198" cy="308914"/>
+              </a:xfrm>
+              <a:prstGeom prst="rect">
+                <a:avLst/>
+              </a:prstGeom>
+              <a:noFill/>
+              <a:ln w="6350">
+                <a:solidFill>
+                  <a:schemeClr val="tx1"/>
+                </a:solidFill>
+              </a:ln>
+            </p:spPr>
+            <p:style>
+              <a:lnRef idx="2">
+                <a:schemeClr val="accent1">
+                  <a:shade val="50000"/>
+                </a:schemeClr>
+              </a:lnRef>
+              <a:fillRef idx="1">
+                <a:schemeClr val="accent1"/>
+              </a:fillRef>
+              <a:effectRef idx="0">
+                <a:schemeClr val="accent1"/>
+              </a:effectRef>
+              <a:fontRef idx="minor">
+                <a:schemeClr val="lt1"/>
+              </a:fontRef>
+            </p:style>
+            <p:txBody>
+              <a:bodyPr rtlCol="0" anchor="ctr"/>
+              <a:lstStyle/>
+              <a:p>
+                <a:pPr algn="ctr"/>
+                <a:endParaRPr lang="en-US"/>
+              </a:p>
+            </p:txBody>
+          </p:sp>
+          <p:sp>
+            <p:nvSpPr>
+              <p:cNvPr id="71" name="Oval 70">
+                <a:extLst>
+                  <a:ext uri="{FF2B5EF4-FFF2-40B4-BE49-F238E27FC236}">
+                    <a16:creationId xmlns:a16="http://schemas.microsoft.com/office/drawing/2014/main" id="{3A875AC1-BB45-F5CD-A202-10C1A398BFDD}"/>
+                  </a:ext>
+                </a:extLst>
+              </p:cNvPr>
+              <p:cNvSpPr/>
+              <p:nvPr/>
+            </p:nvSpPr>
+            <p:spPr>
+              <a:xfrm>
+                <a:off x="9112420" y="2343998"/>
+                <a:ext cx="294198" cy="308914"/>
+              </a:xfrm>
+              <a:prstGeom prst="ellipse">
+                <a:avLst/>
+              </a:prstGeom>
+              <a:noFill/>
+              <a:ln w="6350">
+                <a:solidFill>
+                  <a:schemeClr val="tx1"/>
+                </a:solidFill>
+              </a:ln>
+            </p:spPr>
+            <p:style>
+              <a:lnRef idx="2">
+                <a:schemeClr val="accent1">
+                  <a:shade val="50000"/>
+                </a:schemeClr>
+              </a:lnRef>
+              <a:fillRef idx="1">
+                <a:schemeClr val="accent1"/>
+              </a:fillRef>
+              <a:effectRef idx="0">
+                <a:schemeClr val="accent1"/>
+              </a:effectRef>
+              <a:fontRef idx="minor">
+                <a:schemeClr val="lt1"/>
+              </a:fontRef>
+            </p:style>
+            <p:txBody>
+              <a:bodyPr rtlCol="0" anchor="ctr"/>
+              <a:lstStyle/>
+              <a:p>
+                <a:pPr algn="ctr"/>
+                <a:endParaRPr lang="en-US"/>
+              </a:p>
+            </p:txBody>
+          </p:sp>
+          <p:sp>
+            <p:nvSpPr>
+              <p:cNvPr id="87" name="TextBox 86">
+                <a:extLst>
+                  <a:ext uri="{FF2B5EF4-FFF2-40B4-BE49-F238E27FC236}">
+                    <a16:creationId xmlns:a16="http://schemas.microsoft.com/office/drawing/2014/main" id="{54631165-4A84-5F35-B5FC-C82EE39A6CD7}"/>
+                  </a:ext>
+                </a:extLst>
+              </p:cNvPr>
+              <p:cNvSpPr txBox="1"/>
+              <p:nvPr/>
+            </p:nvSpPr>
+            <p:spPr>
+              <a:xfrm>
+                <a:off x="9462938" y="3706766"/>
+                <a:ext cx="1594457" cy="276999"/>
+              </a:xfrm>
+              <a:prstGeom prst="rect">
+                <a:avLst/>
+              </a:prstGeom>
+              <a:noFill/>
+            </p:spPr>
+            <p:txBody>
+              <a:bodyPr wrap="square" rtlCol="0">
+                <a:spAutoFit/>
+              </a:bodyPr>
+              <a:lstStyle/>
+              <a:p>
+                <a:r>
+                  <a:rPr lang="en-US" sz="1200" dirty="0"/>
+                  <a:t>Homozygous (No SV)</a:t>
+                </a:r>
+              </a:p>
+            </p:txBody>
+          </p:sp>
+          <p:sp>
+            <p:nvSpPr>
+              <p:cNvPr id="88" name="TextBox 87">
+                <a:extLst>
+                  <a:ext uri="{FF2B5EF4-FFF2-40B4-BE49-F238E27FC236}">
+                    <a16:creationId xmlns:a16="http://schemas.microsoft.com/office/drawing/2014/main" id="{63ABB2D9-79BC-C207-44D1-EB5EEE3D3306}"/>
+                  </a:ext>
+                </a:extLst>
+              </p:cNvPr>
+              <p:cNvSpPr txBox="1"/>
+              <p:nvPr/>
+            </p:nvSpPr>
+            <p:spPr>
+              <a:xfrm>
+                <a:off x="9462938" y="4386189"/>
+                <a:ext cx="1931030" cy="276999"/>
+              </a:xfrm>
+              <a:prstGeom prst="rect">
+                <a:avLst/>
+              </a:prstGeom>
+              <a:noFill/>
+            </p:spPr>
+            <p:txBody>
+              <a:bodyPr wrap="square" rtlCol="0">
+                <a:spAutoFit/>
+              </a:bodyPr>
+              <a:lstStyle/>
+              <a:p>
+                <a:r>
+                  <a:rPr lang="en-US" sz="1200" dirty="0"/>
+                  <a:t>Heterozygous (1 Copy of SV)</a:t>
+                </a:r>
+              </a:p>
+            </p:txBody>
+          </p:sp>
+          <p:sp>
+            <p:nvSpPr>
+              <p:cNvPr id="89" name="TextBox 88">
+                <a:extLst>
+                  <a:ext uri="{FF2B5EF4-FFF2-40B4-BE49-F238E27FC236}">
+                    <a16:creationId xmlns:a16="http://schemas.microsoft.com/office/drawing/2014/main" id="{58BC1178-18AB-FA35-5B40-329F36E0E30D}"/>
+                  </a:ext>
+                </a:extLst>
+              </p:cNvPr>
+              <p:cNvSpPr txBox="1"/>
+              <p:nvPr/>
+            </p:nvSpPr>
+            <p:spPr>
+              <a:xfrm>
+                <a:off x="9462938" y="5065613"/>
+                <a:ext cx="2073598" cy="276999"/>
+              </a:xfrm>
+              <a:prstGeom prst="rect">
+                <a:avLst/>
+              </a:prstGeom>
+              <a:noFill/>
+            </p:spPr>
+            <p:txBody>
+              <a:bodyPr wrap="square" rtlCol="0">
+                <a:spAutoFit/>
+              </a:bodyPr>
+              <a:lstStyle/>
+              <a:p>
+                <a:r>
+                  <a:rPr lang="en-US" sz="1200" dirty="0"/>
+                  <a:t>Homozygous (2 Copies of SV)</a:t>
+                </a:r>
+              </a:p>
+            </p:txBody>
+          </p:sp>
+          <p:grpSp>
+            <p:nvGrpSpPr>
+              <p:cNvPr id="2" name="Group 1">
+                <a:extLst>
+                  <a:ext uri="{FF2B5EF4-FFF2-40B4-BE49-F238E27FC236}">
+                    <a16:creationId xmlns:a16="http://schemas.microsoft.com/office/drawing/2014/main" id="{8EE4C7FF-F251-C4DE-721E-3F5F9311455C}"/>
+                  </a:ext>
+                </a:extLst>
+              </p:cNvPr>
+              <p:cNvGrpSpPr/>
+              <p:nvPr/>
+            </p:nvGrpSpPr>
+            <p:grpSpPr>
+              <a:xfrm>
+                <a:off x="9112420" y="4373240"/>
+                <a:ext cx="294198" cy="308915"/>
+                <a:chOff x="5783173" y="6176906"/>
+                <a:chExt cx="294198" cy="308915"/>
+              </a:xfrm>
+            </p:grpSpPr>
+            <p:sp>
+              <p:nvSpPr>
+                <p:cNvPr id="18" name="Rectangle 17">
+                  <a:extLst>
+                    <a:ext uri="{FF2B5EF4-FFF2-40B4-BE49-F238E27FC236}">
+                      <a16:creationId xmlns:a16="http://schemas.microsoft.com/office/drawing/2014/main" id="{632A407F-27F3-119C-800D-CD937DB1625E}"/>
+                    </a:ext>
+                  </a:extLst>
+                </p:cNvPr>
+                <p:cNvSpPr/>
+                <p:nvPr/>
+              </p:nvSpPr>
+              <p:spPr>
+                <a:xfrm>
+                  <a:off x="5783173" y="6176907"/>
+                  <a:ext cx="294198" cy="308914"/>
+                </a:xfrm>
+                <a:prstGeom prst="rect">
+                  <a:avLst/>
+                </a:prstGeom>
+                <a:noFill/>
+                <a:ln w="6350">
+                  <a:solidFill>
+                    <a:schemeClr val="tx1"/>
+                  </a:solidFill>
+                </a:ln>
+              </p:spPr>
+              <p:style>
+                <a:lnRef idx="2">
+                  <a:schemeClr val="accent1">
+                    <a:shade val="50000"/>
+                  </a:schemeClr>
+                </a:lnRef>
+                <a:fillRef idx="1">
+                  <a:schemeClr val="accent1"/>
+                </a:fillRef>
+                <a:effectRef idx="0">
+                  <a:schemeClr val="accent1"/>
+                </a:effectRef>
+                <a:fontRef idx="minor">
+                  <a:schemeClr val="lt1"/>
+                </a:fontRef>
+              </p:style>
+              <p:txBody>
+                <a:bodyPr rtlCol="0" anchor="ctr"/>
+                <a:lstStyle/>
+                <a:p>
+                  <a:pPr algn="ctr"/>
+                  <a:endParaRPr lang="en-US"/>
+                </a:p>
+              </p:txBody>
+            </p:sp>
+            <p:sp>
+              <p:nvSpPr>
+                <p:cNvPr id="90" name="Rectangle 89">
+                  <a:extLst>
+                    <a:ext uri="{FF2B5EF4-FFF2-40B4-BE49-F238E27FC236}">
+                      <a16:creationId xmlns:a16="http://schemas.microsoft.com/office/drawing/2014/main" id="{58C6E99D-B7F9-F2C1-3C97-D104B1ACCF17}"/>
+                    </a:ext>
+                  </a:extLst>
+                </p:cNvPr>
+                <p:cNvSpPr/>
+                <p:nvPr/>
+              </p:nvSpPr>
+              <p:spPr>
+                <a:xfrm>
+                  <a:off x="5928607" y="6176906"/>
+                  <a:ext cx="147099" cy="308914"/>
+                </a:xfrm>
+                <a:prstGeom prst="rect">
+                  <a:avLst/>
+                </a:prstGeom>
+                <a:solidFill>
+                  <a:srgbClr val="063E83"/>
+                </a:solidFill>
+                <a:ln w="6350">
+                  <a:noFill/>
+                </a:ln>
+              </p:spPr>
+              <p:style>
+                <a:lnRef idx="2">
+                  <a:schemeClr val="accent1">
+                    <a:shade val="50000"/>
+                  </a:schemeClr>
+                </a:lnRef>
+                <a:fillRef idx="1">
+                  <a:schemeClr val="accent1"/>
+                </a:fillRef>
+                <a:effectRef idx="0">
+                  <a:schemeClr val="accent1"/>
+                </a:effectRef>
+                <a:fontRef idx="minor">
+                  <a:schemeClr val="lt1"/>
+                </a:fontRef>
+              </p:style>
+              <p:txBody>
+                <a:bodyPr rtlCol="0" anchor="ctr"/>
+                <a:lstStyle/>
+                <a:p>
+                  <a:pPr algn="ctr"/>
+                  <a:endParaRPr lang="en-US"/>
+                </a:p>
+              </p:txBody>
+            </p:sp>
+          </p:grpSp>
+        </p:grpSp>
+      </p:grpSp>
+    </p:spTree>
+    <p:extLst>
+      <p:ext uri="{BB962C8B-B14F-4D97-AF65-F5344CB8AC3E}">
+        <p14:creationId xmlns:p14="http://schemas.microsoft.com/office/powerpoint/2010/main" val="4136935854"/>
+      </p:ext>
+    </p:extLst>
+  </p:cSld>
+  <p:clrMapOvr>
+    <a:masterClrMapping/>
+  </p:clrMapOvr>
+</p:sld>
+</file>
+
+<file path=ppt/slides/slide3.xml><?xml version="1.0" encoding="utf-8"?>
+<p:sld xmlns:a="http://schemas.openxmlformats.org/drawingml/2006/main" xmlns:r="http://schemas.openxmlformats.org/officeDocument/2006/relationships" xmlns:p="http://schemas.openxmlformats.org/presentationml/2006/main">
+  <p:cSld>
+    <p:spTree>
+      <p:nvGrpSpPr>
+        <p:cNvPr id="1" name=""/>
+        <p:cNvGrpSpPr/>
+        <p:nvPr/>
+      </p:nvGrpSpPr>
+      <p:grpSpPr>
+        <a:xfrm>
+          <a:off x="0" y="0"/>
+          <a:ext cx="0" cy="0"/>
+          <a:chOff x="0" y="0"/>
+          <a:chExt cx="0" cy="0"/>
+        </a:xfrm>
+      </p:grpSpPr>
+      <p:sp>
+        <p:nvSpPr>
+          <p:cNvPr id="3" name="Double Bracket 2">
+            <a:extLst>
+              <a:ext uri="{FF2B5EF4-FFF2-40B4-BE49-F238E27FC236}">
+                <a16:creationId xmlns:a16="http://schemas.microsoft.com/office/drawing/2014/main" id="{3DC13168-A222-09FE-B470-BBC945D8BCEB}"/>
+              </a:ext>
+            </a:extLst>
+          </p:cNvPr>
+          <p:cNvSpPr/>
+          <p:nvPr/>
+        </p:nvSpPr>
+        <p:spPr>
+          <a:xfrm>
+            <a:off x="725384" y="804594"/>
+            <a:ext cx="771896" cy="5688281"/>
+          </a:xfrm>
+          <a:prstGeom prst="bracketPair">
+            <a:avLst/>
+          </a:prstGeom>
+        </p:spPr>
+        <p:style>
+          <a:lnRef idx="1">
+            <a:schemeClr val="accent1"/>
+          </a:lnRef>
+          <a:fillRef idx="0">
+            <a:schemeClr val="accent1"/>
+          </a:fillRef>
+          <a:effectRef idx="0">
+            <a:schemeClr val="accent1"/>
+          </a:effectRef>
+          <a:fontRef idx="minor">
+            <a:schemeClr val="tx1"/>
+          </a:fontRef>
+        </p:style>
+        <p:txBody>
+          <a:bodyPr rtlCol="0" anchor="ctr"/>
+          <a:lstStyle/>
+          <a:p>
+            <a:pPr algn="ctr"/>
+            <a:endParaRPr lang="en-US"/>
+          </a:p>
+        </p:txBody>
+      </p:sp>
+      <p:sp>
+        <p:nvSpPr>
+          <p:cNvPr id="4" name="Rounded Rectangle 3">
+            <a:extLst>
+              <a:ext uri="{FF2B5EF4-FFF2-40B4-BE49-F238E27FC236}">
+                <a16:creationId xmlns:a16="http://schemas.microsoft.com/office/drawing/2014/main" id="{78DD85FF-6B61-3218-B47F-6C1A5E3A5844}"/>
+              </a:ext>
+            </a:extLst>
+          </p:cNvPr>
+          <p:cNvSpPr/>
+          <p:nvPr/>
+        </p:nvSpPr>
+        <p:spPr>
+          <a:xfrm>
+            <a:off x="838201" y="911472"/>
+            <a:ext cx="546265" cy="831273"/>
+          </a:xfrm>
+          <a:prstGeom prst="roundRect">
+            <a:avLst/>
+          </a:prstGeom>
+        </p:spPr>
+        <p:style>
+          <a:lnRef idx="2">
+            <a:schemeClr val="accent1">
+              <a:shade val="50000"/>
+            </a:schemeClr>
+          </a:lnRef>
+          <a:fillRef idx="1">
+            <a:schemeClr val="accent1"/>
+          </a:fillRef>
+          <a:effectRef idx="0">
+            <a:schemeClr val="accent1"/>
+          </a:effectRef>
+          <a:fontRef idx="minor">
+            <a:schemeClr val="lt1"/>
+          </a:fontRef>
+        </p:style>
+        <p:txBody>
+          <a:bodyPr rtlCol="0" anchor="ctr"/>
+          <a:lstStyle/>
+          <a:p>
+            <a:pPr algn="ctr"/>
+            <a:endParaRPr lang="en-US" dirty="0"/>
+          </a:p>
+        </p:txBody>
+      </p:sp>
+      <p:sp>
+        <p:nvSpPr>
+          <p:cNvPr id="5" name="Rounded Rectangle 4">
+            <a:extLst>
+              <a:ext uri="{FF2B5EF4-FFF2-40B4-BE49-F238E27FC236}">
+                <a16:creationId xmlns:a16="http://schemas.microsoft.com/office/drawing/2014/main" id="{B86EE32B-E48C-A40C-09DA-934801E211C2}"/>
+              </a:ext>
+            </a:extLst>
+          </p:cNvPr>
+          <p:cNvSpPr/>
+          <p:nvPr/>
+        </p:nvSpPr>
+        <p:spPr>
+          <a:xfrm>
+            <a:off x="838200" y="1843685"/>
+            <a:ext cx="546265" cy="831273"/>
+          </a:xfrm>
+          <a:prstGeom prst="roundRect">
+            <a:avLst/>
+          </a:prstGeom>
+          <a:solidFill>
+            <a:schemeClr val="accent2">
+              <a:lumMod val="50000"/>
+            </a:schemeClr>
+          </a:solidFill>
+          <a:ln>
+            <a:solidFill>
+              <a:schemeClr val="accent2">
+                <a:lumMod val="50000"/>
+              </a:schemeClr>
+            </a:solidFill>
+          </a:ln>
+        </p:spPr>
+        <p:style>
+          <a:lnRef idx="2">
+            <a:schemeClr val="accent1">
+              <a:shade val="50000"/>
+            </a:schemeClr>
+          </a:lnRef>
+          <a:fillRef idx="1">
+            <a:schemeClr val="accent1"/>
+          </a:fillRef>
+          <a:effectRef idx="0">
+            <a:schemeClr val="accent1"/>
+          </a:effectRef>
+          <a:fontRef idx="minor">
+            <a:schemeClr val="lt1"/>
+          </a:fontRef>
+        </p:style>
+        <p:txBody>
+          <a:bodyPr rtlCol="0" anchor="ctr"/>
+          <a:lstStyle/>
+          <a:p>
+            <a:pPr algn="ctr"/>
+            <a:endParaRPr lang="en-US"/>
+          </a:p>
+        </p:txBody>
+      </p:sp>
+      <p:sp>
+        <p:nvSpPr>
+          <p:cNvPr id="6" name="Rounded Rectangle 5">
+            <a:extLst>
+              <a:ext uri="{FF2B5EF4-FFF2-40B4-BE49-F238E27FC236}">
+                <a16:creationId xmlns:a16="http://schemas.microsoft.com/office/drawing/2014/main" id="{2208D480-993D-9BEC-0B4B-9CCE2977FF05}"/>
+              </a:ext>
+            </a:extLst>
+          </p:cNvPr>
+          <p:cNvSpPr/>
+          <p:nvPr/>
+        </p:nvSpPr>
+        <p:spPr>
+          <a:xfrm>
+            <a:off x="838200" y="2775898"/>
+            <a:ext cx="546265" cy="831273"/>
+          </a:xfrm>
+          <a:prstGeom prst="roundRect">
+            <a:avLst/>
+          </a:prstGeom>
+          <a:solidFill>
+            <a:schemeClr val="accent2">
+              <a:lumMod val="75000"/>
+            </a:schemeClr>
+          </a:solidFill>
+          <a:ln>
+            <a:solidFill>
+              <a:schemeClr val="accent2">
+                <a:lumMod val="75000"/>
+              </a:schemeClr>
+            </a:solidFill>
+          </a:ln>
+        </p:spPr>
+        <p:style>
+          <a:lnRef idx="2">
+            <a:schemeClr val="accent1">
+              <a:shade val="50000"/>
+            </a:schemeClr>
+          </a:lnRef>
+          <a:fillRef idx="1">
+            <a:schemeClr val="accent1"/>
+          </a:fillRef>
+          <a:effectRef idx="0">
+            <a:schemeClr val="accent1"/>
+          </a:effectRef>
+          <a:fontRef idx="minor">
+            <a:schemeClr val="lt1"/>
+          </a:fontRef>
+        </p:style>
+        <p:txBody>
+          <a:bodyPr rtlCol="0" anchor="ctr"/>
+          <a:lstStyle/>
+          <a:p>
+            <a:pPr algn="ctr"/>
+            <a:endParaRPr lang="en-US"/>
+          </a:p>
+        </p:txBody>
+      </p:sp>
+      <p:sp>
+        <p:nvSpPr>
+          <p:cNvPr id="10" name="Rounded Rectangle 9">
+            <a:extLst>
+              <a:ext uri="{FF2B5EF4-FFF2-40B4-BE49-F238E27FC236}">
+                <a16:creationId xmlns:a16="http://schemas.microsoft.com/office/drawing/2014/main" id="{3DDE8331-EE68-D2F7-0E90-56F4551EC26A}"/>
+              </a:ext>
+            </a:extLst>
+          </p:cNvPr>
+          <p:cNvSpPr/>
+          <p:nvPr/>
+        </p:nvSpPr>
+        <p:spPr>
+          <a:xfrm>
+            <a:off x="838201" y="3690298"/>
+            <a:ext cx="546265" cy="831273"/>
+          </a:xfrm>
+          <a:prstGeom prst="roundRect">
+            <a:avLst/>
+          </a:prstGeom>
+        </p:spPr>
+        <p:style>
+          <a:lnRef idx="2">
+            <a:schemeClr val="accent1">
+              <a:shade val="50000"/>
+            </a:schemeClr>
+          </a:lnRef>
+          <a:fillRef idx="1">
+            <a:schemeClr val="accent1"/>
+          </a:fillRef>
+          <a:effectRef idx="0">
+            <a:schemeClr val="accent1"/>
+          </a:effectRef>
+          <a:fontRef idx="minor">
+            <a:schemeClr val="lt1"/>
+          </a:fontRef>
+        </p:style>
+        <p:txBody>
+          <a:bodyPr rtlCol="0" anchor="ctr"/>
+          <a:lstStyle/>
+          <a:p>
+            <a:pPr algn="ctr"/>
+            <a:endParaRPr lang="en-US"/>
+          </a:p>
+        </p:txBody>
+      </p:sp>
+      <p:sp>
+        <p:nvSpPr>
+          <p:cNvPr id="11" name="Rounded Rectangle 10">
+            <a:extLst>
+              <a:ext uri="{FF2B5EF4-FFF2-40B4-BE49-F238E27FC236}">
+                <a16:creationId xmlns:a16="http://schemas.microsoft.com/office/drawing/2014/main" id="{909F8A78-9677-3CAA-B926-9F8C2EE2E79C}"/>
+              </a:ext>
+            </a:extLst>
+          </p:cNvPr>
+          <p:cNvSpPr/>
+          <p:nvPr/>
+        </p:nvSpPr>
+        <p:spPr>
+          <a:xfrm>
+            <a:off x="838200" y="4622511"/>
+            <a:ext cx="546265" cy="831273"/>
+          </a:xfrm>
+          <a:prstGeom prst="roundRect">
+            <a:avLst/>
+          </a:prstGeom>
+          <a:solidFill>
+            <a:schemeClr val="accent2">
+              <a:lumMod val="50000"/>
+            </a:schemeClr>
+          </a:solidFill>
+          <a:ln>
+            <a:solidFill>
+              <a:schemeClr val="accent2">
+                <a:lumMod val="50000"/>
+              </a:schemeClr>
+            </a:solidFill>
+          </a:ln>
+        </p:spPr>
+        <p:style>
+          <a:lnRef idx="2">
+            <a:schemeClr val="accent1">
+              <a:shade val="50000"/>
+            </a:schemeClr>
+          </a:lnRef>
+          <a:fillRef idx="1">
+            <a:schemeClr val="accent1"/>
+          </a:fillRef>
+          <a:effectRef idx="0">
+            <a:schemeClr val="accent1"/>
+          </a:effectRef>
+          <a:fontRef idx="minor">
+            <a:schemeClr val="lt1"/>
+          </a:fontRef>
+        </p:style>
+        <p:txBody>
+          <a:bodyPr rtlCol="0" anchor="ctr"/>
+          <a:lstStyle/>
+          <a:p>
+            <a:pPr algn="ctr"/>
+            <a:endParaRPr lang="en-US"/>
+          </a:p>
+        </p:txBody>
+      </p:sp>
+      <p:sp>
+        <p:nvSpPr>
+          <p:cNvPr id="12" name="Rounded Rectangle 11">
+            <a:extLst>
+              <a:ext uri="{FF2B5EF4-FFF2-40B4-BE49-F238E27FC236}">
+                <a16:creationId xmlns:a16="http://schemas.microsoft.com/office/drawing/2014/main" id="{56323674-8339-05B5-BA8C-E80F960CD639}"/>
+              </a:ext>
+            </a:extLst>
+          </p:cNvPr>
+          <p:cNvSpPr/>
+          <p:nvPr/>
+        </p:nvSpPr>
+        <p:spPr>
+          <a:xfrm>
+            <a:off x="838200" y="5554724"/>
+            <a:ext cx="546265" cy="831273"/>
+          </a:xfrm>
+          <a:prstGeom prst="roundRect">
+            <a:avLst/>
+          </a:prstGeom>
+          <a:solidFill>
+            <a:schemeClr val="accent2">
+              <a:lumMod val="75000"/>
+            </a:schemeClr>
+          </a:solidFill>
+          <a:ln>
+            <a:solidFill>
+              <a:schemeClr val="accent2">
+                <a:lumMod val="75000"/>
+              </a:schemeClr>
+            </a:solidFill>
+          </a:ln>
+        </p:spPr>
+        <p:style>
+          <a:lnRef idx="2">
+            <a:schemeClr val="accent1">
+              <a:shade val="50000"/>
+            </a:schemeClr>
+          </a:lnRef>
+          <a:fillRef idx="1">
+            <a:schemeClr val="accent1"/>
+          </a:fillRef>
+          <a:effectRef idx="0">
+            <a:schemeClr val="accent1"/>
+          </a:effectRef>
+          <a:fontRef idx="minor">
+            <a:schemeClr val="lt1"/>
+          </a:fontRef>
+        </p:style>
+        <p:txBody>
+          <a:bodyPr rtlCol="0" anchor="ctr"/>
+          <a:lstStyle/>
+          <a:p>
+            <a:pPr algn="ctr"/>
+            <a:endParaRPr lang="en-US"/>
+          </a:p>
+        </p:txBody>
+      </p:sp>
+      <p:sp>
+        <p:nvSpPr>
+          <p:cNvPr id="13" name="Rounded Rectangle 12">
+            <a:extLst>
+              <a:ext uri="{FF2B5EF4-FFF2-40B4-BE49-F238E27FC236}">
+                <a16:creationId xmlns:a16="http://schemas.microsoft.com/office/drawing/2014/main" id="{1660BFFF-00C6-DA43-10A2-74AA52DF6D23}"/>
+              </a:ext>
+            </a:extLst>
+          </p:cNvPr>
+          <p:cNvSpPr/>
+          <p:nvPr/>
+        </p:nvSpPr>
+        <p:spPr>
+          <a:xfrm>
+            <a:off x="2643743" y="2361807"/>
+            <a:ext cx="280059" cy="264185"/>
+          </a:xfrm>
+          <a:prstGeom prst="roundRect">
+            <a:avLst/>
+          </a:prstGeom>
+        </p:spPr>
+        <p:style>
+          <a:lnRef idx="2">
+            <a:schemeClr val="accent1">
+              <a:shade val="50000"/>
+            </a:schemeClr>
+          </a:lnRef>
+          <a:fillRef idx="1">
+            <a:schemeClr val="accent1"/>
+          </a:fillRef>
+          <a:effectRef idx="0">
+            <a:schemeClr val="accent1"/>
+          </a:effectRef>
+          <a:fontRef idx="minor">
+            <a:schemeClr val="lt1"/>
+          </a:fontRef>
+        </p:style>
+        <p:txBody>
+          <a:bodyPr rtlCol="0" anchor="ctr"/>
+          <a:lstStyle/>
+          <a:p>
+            <a:pPr algn="ctr"/>
+            <a:endParaRPr lang="en-US"/>
+          </a:p>
+        </p:txBody>
+      </p:sp>
+      <p:sp>
+        <p:nvSpPr>
+          <p:cNvPr id="14" name="Rounded Rectangle 13">
+            <a:extLst>
+              <a:ext uri="{FF2B5EF4-FFF2-40B4-BE49-F238E27FC236}">
+                <a16:creationId xmlns:a16="http://schemas.microsoft.com/office/drawing/2014/main" id="{56B3B769-C860-58FC-A9F4-256F9C75DACD}"/>
+              </a:ext>
+            </a:extLst>
+          </p:cNvPr>
+          <p:cNvSpPr/>
+          <p:nvPr/>
+        </p:nvSpPr>
+        <p:spPr>
+          <a:xfrm>
+            <a:off x="2643743" y="2761111"/>
+            <a:ext cx="280059" cy="264185"/>
+          </a:xfrm>
+          <a:prstGeom prst="roundRect">
+            <a:avLst/>
+          </a:prstGeom>
+          <a:solidFill>
+            <a:schemeClr val="accent2">
+              <a:lumMod val="50000"/>
+            </a:schemeClr>
+          </a:solidFill>
+          <a:ln>
+            <a:solidFill>
+              <a:schemeClr val="accent2">
+                <a:lumMod val="50000"/>
+              </a:schemeClr>
+            </a:solidFill>
+          </a:ln>
+        </p:spPr>
+        <p:style>
+          <a:lnRef idx="2">
+            <a:schemeClr val="accent1">
+              <a:shade val="50000"/>
+            </a:schemeClr>
+          </a:lnRef>
+          <a:fillRef idx="1">
+            <a:schemeClr val="accent1"/>
+          </a:fillRef>
+          <a:effectRef idx="0">
+            <a:schemeClr val="accent1"/>
+          </a:effectRef>
+          <a:fontRef idx="minor">
+            <a:schemeClr val="lt1"/>
+          </a:fontRef>
+        </p:style>
+        <p:txBody>
+          <a:bodyPr rtlCol="0" anchor="ctr"/>
+          <a:lstStyle/>
+          <a:p>
+            <a:pPr algn="ctr"/>
+            <a:endParaRPr lang="en-US"/>
+          </a:p>
+        </p:txBody>
+      </p:sp>
+      <p:sp>
+        <p:nvSpPr>
+          <p:cNvPr id="15" name="Rounded Rectangle 14">
+            <a:extLst>
+              <a:ext uri="{FF2B5EF4-FFF2-40B4-BE49-F238E27FC236}">
+                <a16:creationId xmlns:a16="http://schemas.microsoft.com/office/drawing/2014/main" id="{CE0BBBE7-F6E3-10C4-6B59-84231C67ADFE}"/>
+              </a:ext>
+            </a:extLst>
+          </p:cNvPr>
+          <p:cNvSpPr/>
+          <p:nvPr/>
+        </p:nvSpPr>
+        <p:spPr>
+          <a:xfrm>
+            <a:off x="2643743" y="3160415"/>
+            <a:ext cx="280059" cy="264185"/>
+          </a:xfrm>
+          <a:prstGeom prst="roundRect">
+            <a:avLst/>
+          </a:prstGeom>
+          <a:solidFill>
+            <a:schemeClr val="accent2">
+              <a:lumMod val="75000"/>
+            </a:schemeClr>
+          </a:solidFill>
+          <a:ln>
+            <a:solidFill>
+              <a:schemeClr val="accent2">
+                <a:lumMod val="75000"/>
+              </a:schemeClr>
+            </a:solidFill>
+          </a:ln>
+        </p:spPr>
+        <p:style>
+          <a:lnRef idx="2">
+            <a:schemeClr val="accent1">
+              <a:shade val="50000"/>
+            </a:schemeClr>
+          </a:lnRef>
+          <a:fillRef idx="1">
+            <a:schemeClr val="accent1"/>
+          </a:fillRef>
+          <a:effectRef idx="0">
+            <a:schemeClr val="accent1"/>
+          </a:effectRef>
+          <a:fontRef idx="minor">
+            <a:schemeClr val="lt1"/>
+          </a:fontRef>
+        </p:style>
+        <p:txBody>
+          <a:bodyPr rtlCol="0" anchor="ctr"/>
+          <a:lstStyle/>
+          <a:p>
+            <a:pPr algn="ctr"/>
+            <a:endParaRPr lang="en-US"/>
+          </a:p>
+        </p:txBody>
+      </p:sp>
+      <p:sp>
+        <p:nvSpPr>
+          <p:cNvPr id="16" name="Rounded Rectangle 15">
+            <a:extLst>
+              <a:ext uri="{FF2B5EF4-FFF2-40B4-BE49-F238E27FC236}">
+                <a16:creationId xmlns:a16="http://schemas.microsoft.com/office/drawing/2014/main" id="{8D57A012-C4CE-2134-7CF0-9BA833B83CF1}"/>
+              </a:ext>
+            </a:extLst>
+          </p:cNvPr>
+          <p:cNvSpPr/>
+          <p:nvPr/>
+        </p:nvSpPr>
+        <p:spPr>
+          <a:xfrm>
+            <a:off x="2643743" y="3559719"/>
+            <a:ext cx="280059" cy="264185"/>
+          </a:xfrm>
+          <a:prstGeom prst="roundRect">
+            <a:avLst/>
+          </a:prstGeom>
+        </p:spPr>
+        <p:style>
+          <a:lnRef idx="2">
+            <a:schemeClr val="accent1">
+              <a:shade val="50000"/>
+            </a:schemeClr>
+          </a:lnRef>
+          <a:fillRef idx="1">
+            <a:schemeClr val="accent1"/>
+          </a:fillRef>
+          <a:effectRef idx="0">
+            <a:schemeClr val="accent1"/>
+          </a:effectRef>
+          <a:fontRef idx="minor">
+            <a:schemeClr val="lt1"/>
+          </a:fontRef>
+        </p:style>
+        <p:txBody>
+          <a:bodyPr rtlCol="0" anchor="ctr"/>
+          <a:lstStyle/>
+          <a:p>
+            <a:pPr algn="ctr"/>
+            <a:endParaRPr lang="en-US"/>
+          </a:p>
+        </p:txBody>
+      </p:sp>
+      <p:sp>
+        <p:nvSpPr>
+          <p:cNvPr id="17" name="Rounded Rectangle 16">
+            <a:extLst>
+              <a:ext uri="{FF2B5EF4-FFF2-40B4-BE49-F238E27FC236}">
+                <a16:creationId xmlns:a16="http://schemas.microsoft.com/office/drawing/2014/main" id="{CBF92E9F-520E-ED47-4ED6-F162DA39BAFA}"/>
+              </a:ext>
+            </a:extLst>
+          </p:cNvPr>
+          <p:cNvSpPr/>
+          <p:nvPr/>
+        </p:nvSpPr>
+        <p:spPr>
+          <a:xfrm>
+            <a:off x="2643743" y="3959023"/>
+            <a:ext cx="280059" cy="264185"/>
+          </a:xfrm>
+          <a:prstGeom prst="roundRect">
+            <a:avLst/>
+          </a:prstGeom>
+          <a:solidFill>
+            <a:schemeClr val="accent2">
+              <a:lumMod val="50000"/>
+            </a:schemeClr>
+          </a:solidFill>
+          <a:ln>
+            <a:solidFill>
+              <a:schemeClr val="accent2">
+                <a:lumMod val="50000"/>
+              </a:schemeClr>
+            </a:solidFill>
+          </a:ln>
+        </p:spPr>
+        <p:style>
+          <a:lnRef idx="2">
+            <a:schemeClr val="accent1">
+              <a:shade val="50000"/>
+            </a:schemeClr>
+          </a:lnRef>
+          <a:fillRef idx="1">
+            <a:schemeClr val="accent1"/>
+          </a:fillRef>
+          <a:effectRef idx="0">
+            <a:schemeClr val="accent1"/>
+          </a:effectRef>
+          <a:fontRef idx="minor">
+            <a:schemeClr val="lt1"/>
+          </a:fontRef>
+        </p:style>
+        <p:txBody>
+          <a:bodyPr rtlCol="0" anchor="ctr"/>
+          <a:lstStyle/>
+          <a:p>
+            <a:pPr algn="ctr"/>
+            <a:endParaRPr lang="en-US"/>
+          </a:p>
+        </p:txBody>
+      </p:sp>
+      <p:sp>
+        <p:nvSpPr>
+          <p:cNvPr id="18" name="Rounded Rectangle 17">
+            <a:extLst>
+              <a:ext uri="{FF2B5EF4-FFF2-40B4-BE49-F238E27FC236}">
+                <a16:creationId xmlns:a16="http://schemas.microsoft.com/office/drawing/2014/main" id="{EF459AC1-019E-6FC0-107C-92FE71EA9606}"/>
+              </a:ext>
+            </a:extLst>
+          </p:cNvPr>
+          <p:cNvSpPr/>
+          <p:nvPr/>
+        </p:nvSpPr>
+        <p:spPr>
+          <a:xfrm>
+            <a:off x="2643743" y="4358326"/>
+            <a:ext cx="280059" cy="264185"/>
+          </a:xfrm>
+          <a:prstGeom prst="roundRect">
+            <a:avLst/>
+          </a:prstGeom>
+          <a:solidFill>
+            <a:schemeClr val="accent2">
+              <a:lumMod val="75000"/>
+            </a:schemeClr>
+          </a:solidFill>
+          <a:ln>
+            <a:solidFill>
+              <a:schemeClr val="accent2">
+                <a:lumMod val="75000"/>
+              </a:schemeClr>
+            </a:solidFill>
+          </a:ln>
+        </p:spPr>
+        <p:style>
+          <a:lnRef idx="2">
+            <a:schemeClr val="accent1">
+              <a:shade val="50000"/>
+            </a:schemeClr>
+          </a:lnRef>
+          <a:fillRef idx="1">
+            <a:schemeClr val="accent1"/>
+          </a:fillRef>
+          <a:effectRef idx="0">
+            <a:schemeClr val="accent1"/>
+          </a:effectRef>
+          <a:fontRef idx="minor">
+            <a:schemeClr val="lt1"/>
+          </a:fontRef>
+        </p:style>
+        <p:txBody>
+          <a:bodyPr rtlCol="0" anchor="ctr"/>
+          <a:lstStyle/>
+          <a:p>
+            <a:pPr algn="ctr"/>
+            <a:endParaRPr lang="en-US"/>
+          </a:p>
+        </p:txBody>
+      </p:sp>
+      <p:cxnSp>
+        <p:nvCxnSpPr>
+          <p:cNvPr id="20" name="Straight Arrow Connector 19">
+            <a:extLst>
+              <a:ext uri="{FF2B5EF4-FFF2-40B4-BE49-F238E27FC236}">
+                <a16:creationId xmlns:a16="http://schemas.microsoft.com/office/drawing/2014/main" id="{577DB895-AC23-3D42-1A73-7FC5FDE82328}"/>
+              </a:ext>
+            </a:extLst>
+          </p:cNvPr>
+          <p:cNvCxnSpPr>
+            <a:cxnSpLocks/>
+            <a:stCxn id="4" idx="3"/>
+            <a:endCxn id="13" idx="1"/>
+          </p:cNvCxnSpPr>
+          <p:nvPr/>
+        </p:nvCxnSpPr>
+        <p:spPr>
+          <a:xfrm>
+            <a:off x="1384466" y="1327109"/>
+            <a:ext cx="1259277" cy="1166791"/>
+          </a:xfrm>
+          <a:prstGeom prst="straightConnector1">
+            <a:avLst/>
+          </a:prstGeom>
+          <a:ln>
+            <a:tailEnd type="triangle"/>
+          </a:ln>
+        </p:spPr>
+        <p:style>
+          <a:lnRef idx="1">
+            <a:schemeClr val="accent1"/>
+          </a:lnRef>
+          <a:fillRef idx="0">
+            <a:schemeClr val="accent1"/>
+          </a:fillRef>
+          <a:effectRef idx="0">
+            <a:schemeClr val="accent1"/>
+          </a:effectRef>
+          <a:fontRef idx="minor">
+            <a:schemeClr val="tx1"/>
+          </a:fontRef>
+        </p:style>
+      </p:cxnSp>
+      <p:cxnSp>
+        <p:nvCxnSpPr>
+          <p:cNvPr id="22" name="Straight Arrow Connector 21">
+            <a:extLst>
+              <a:ext uri="{FF2B5EF4-FFF2-40B4-BE49-F238E27FC236}">
+                <a16:creationId xmlns:a16="http://schemas.microsoft.com/office/drawing/2014/main" id="{808C9346-95A5-EF97-F5E3-E131CE358B61}"/>
+              </a:ext>
+            </a:extLst>
+          </p:cNvPr>
+          <p:cNvCxnSpPr>
+            <a:cxnSpLocks/>
+            <a:stCxn id="5" idx="3"/>
+            <a:endCxn id="14" idx="1"/>
+          </p:cNvCxnSpPr>
+          <p:nvPr/>
+        </p:nvCxnSpPr>
+        <p:spPr>
+          <a:xfrm>
+            <a:off x="1384465" y="2259322"/>
+            <a:ext cx="1259278" cy="633882"/>
+          </a:xfrm>
+          <a:prstGeom prst="straightConnector1">
+            <a:avLst/>
+          </a:prstGeom>
+          <a:ln>
+            <a:tailEnd type="triangle"/>
+          </a:ln>
+        </p:spPr>
+        <p:style>
+          <a:lnRef idx="1">
+            <a:schemeClr val="accent1"/>
+          </a:lnRef>
+          <a:fillRef idx="0">
+            <a:schemeClr val="accent1"/>
+          </a:fillRef>
+          <a:effectRef idx="0">
+            <a:schemeClr val="accent1"/>
+          </a:effectRef>
+          <a:fontRef idx="minor">
+            <a:schemeClr val="tx1"/>
+          </a:fontRef>
+        </p:style>
+      </p:cxnSp>
+      <p:cxnSp>
+        <p:nvCxnSpPr>
+          <p:cNvPr id="25" name="Straight Arrow Connector 24">
+            <a:extLst>
+              <a:ext uri="{FF2B5EF4-FFF2-40B4-BE49-F238E27FC236}">
+                <a16:creationId xmlns:a16="http://schemas.microsoft.com/office/drawing/2014/main" id="{E72F5702-9C82-B0E1-9938-2B315FA705FC}"/>
+              </a:ext>
+            </a:extLst>
+          </p:cNvPr>
+          <p:cNvCxnSpPr>
+            <a:cxnSpLocks/>
+            <a:stCxn id="6" idx="3"/>
+          </p:cNvCxnSpPr>
+          <p:nvPr/>
+        </p:nvCxnSpPr>
+        <p:spPr>
+          <a:xfrm>
+            <a:off x="1384465" y="3191535"/>
+            <a:ext cx="1259278" cy="106746"/>
+          </a:xfrm>
+          <a:prstGeom prst="straightConnector1">
+            <a:avLst/>
+          </a:prstGeom>
+          <a:ln>
+            <a:tailEnd type="triangle"/>
+          </a:ln>
+        </p:spPr>
+        <p:style>
+          <a:lnRef idx="1">
+            <a:schemeClr val="accent1"/>
+          </a:lnRef>
+          <a:fillRef idx="0">
+            <a:schemeClr val="accent1"/>
+          </a:fillRef>
+          <a:effectRef idx="0">
+            <a:schemeClr val="accent1"/>
+          </a:effectRef>
+          <a:fontRef idx="minor">
+            <a:schemeClr val="tx1"/>
+          </a:fontRef>
+        </p:style>
+      </p:cxnSp>
+      <p:cxnSp>
+        <p:nvCxnSpPr>
+          <p:cNvPr id="28" name="Straight Arrow Connector 27">
+            <a:extLst>
+              <a:ext uri="{FF2B5EF4-FFF2-40B4-BE49-F238E27FC236}">
+                <a16:creationId xmlns:a16="http://schemas.microsoft.com/office/drawing/2014/main" id="{6529B2A9-76C1-CD1D-8CCA-6EA3B7E7A23B}"/>
+              </a:ext>
+            </a:extLst>
+          </p:cNvPr>
+          <p:cNvCxnSpPr>
+            <a:cxnSpLocks/>
+            <a:stCxn id="10" idx="3"/>
+            <a:endCxn id="16" idx="1"/>
+          </p:cNvCxnSpPr>
+          <p:nvPr/>
+        </p:nvCxnSpPr>
+        <p:spPr>
+          <a:xfrm flipV="1">
+            <a:off x="1384466" y="3691812"/>
+            <a:ext cx="1259277" cy="414123"/>
+          </a:xfrm>
+          <a:prstGeom prst="straightConnector1">
+            <a:avLst/>
+          </a:prstGeom>
+          <a:ln>
+            <a:tailEnd type="triangle"/>
+          </a:ln>
+        </p:spPr>
+        <p:style>
+          <a:lnRef idx="1">
+            <a:schemeClr val="accent1"/>
+          </a:lnRef>
+          <a:fillRef idx="0">
+            <a:schemeClr val="accent1"/>
+          </a:fillRef>
+          <a:effectRef idx="0">
+            <a:schemeClr val="accent1"/>
+          </a:effectRef>
+          <a:fontRef idx="minor">
+            <a:schemeClr val="tx1"/>
+          </a:fontRef>
+        </p:style>
+      </p:cxnSp>
+      <p:cxnSp>
+        <p:nvCxnSpPr>
+          <p:cNvPr id="31" name="Straight Arrow Connector 30">
+            <a:extLst>
+              <a:ext uri="{FF2B5EF4-FFF2-40B4-BE49-F238E27FC236}">
+                <a16:creationId xmlns:a16="http://schemas.microsoft.com/office/drawing/2014/main" id="{FB251546-6A78-B480-E71A-4C95E900AD51}"/>
+              </a:ext>
+            </a:extLst>
+          </p:cNvPr>
+          <p:cNvCxnSpPr>
+            <a:cxnSpLocks/>
+            <a:stCxn id="11" idx="3"/>
+            <a:endCxn id="17" idx="1"/>
+          </p:cNvCxnSpPr>
+          <p:nvPr/>
+        </p:nvCxnSpPr>
+        <p:spPr>
+          <a:xfrm flipV="1">
+            <a:off x="1384465" y="4091116"/>
+            <a:ext cx="1259278" cy="947032"/>
+          </a:xfrm>
+          <a:prstGeom prst="straightConnector1">
+            <a:avLst/>
+          </a:prstGeom>
+          <a:ln>
+            <a:tailEnd type="triangle"/>
+          </a:ln>
+        </p:spPr>
+        <p:style>
+          <a:lnRef idx="1">
+            <a:schemeClr val="accent1"/>
+          </a:lnRef>
+          <a:fillRef idx="0">
+            <a:schemeClr val="accent1"/>
+          </a:fillRef>
+          <a:effectRef idx="0">
+            <a:schemeClr val="accent1"/>
+          </a:effectRef>
+          <a:fontRef idx="minor">
+            <a:schemeClr val="tx1"/>
+          </a:fontRef>
+        </p:style>
+      </p:cxnSp>
+      <p:cxnSp>
+        <p:nvCxnSpPr>
+          <p:cNvPr id="35" name="Straight Arrow Connector 34">
+            <a:extLst>
+              <a:ext uri="{FF2B5EF4-FFF2-40B4-BE49-F238E27FC236}">
+                <a16:creationId xmlns:a16="http://schemas.microsoft.com/office/drawing/2014/main" id="{4D945237-48BA-AE9D-16F1-EE4D76D1B9C4}"/>
+              </a:ext>
+            </a:extLst>
+          </p:cNvPr>
+          <p:cNvCxnSpPr>
+            <a:cxnSpLocks/>
+            <a:endCxn id="18" idx="1"/>
+          </p:cNvCxnSpPr>
+          <p:nvPr/>
+        </p:nvCxnSpPr>
+        <p:spPr>
+          <a:xfrm flipV="1">
+            <a:off x="1384465" y="4490419"/>
+            <a:ext cx="1259278" cy="1473915"/>
+          </a:xfrm>
+          <a:prstGeom prst="straightConnector1">
+            <a:avLst/>
+          </a:prstGeom>
+          <a:ln>
+            <a:tailEnd type="triangle"/>
+          </a:ln>
+        </p:spPr>
+        <p:style>
+          <a:lnRef idx="1">
+            <a:schemeClr val="accent1"/>
+          </a:lnRef>
+          <a:fillRef idx="0">
+            <a:schemeClr val="accent1"/>
+          </a:fillRef>
+          <a:effectRef idx="0">
+            <a:schemeClr val="accent1"/>
+          </a:effectRef>
+          <a:fontRef idx="minor">
+            <a:schemeClr val="tx1"/>
+          </a:fontRef>
+        </p:style>
+      </p:cxnSp>
     </p:spTree>
     <p:extLst>
       <p:ext uri="{BB962C8B-B14F-4D97-AF65-F5344CB8AC3E}">

</xml_diff>